<commit_message>
Added slides on Volatie vs Interlocked vs Lock
</commit_message>
<xml_diff>
--- a/SOLID.DesignPatterns/Singleton/Singleton - Presentation.pptx
+++ b/SOLID.DesignPatterns/Singleton/Singleton - Presentation.pptx
@@ -32,24 +32,32 @@
     <p:sldId id="276" r:id="rId26"/>
     <p:sldId id="277" r:id="rId27"/>
     <p:sldId id="278" r:id="rId28"/>
-    <p:sldId id="279" r:id="rId29"/>
-    <p:sldId id="280" r:id="rId30"/>
-    <p:sldId id="299" r:id="rId31"/>
-    <p:sldId id="300" r:id="rId32"/>
-    <p:sldId id="301" r:id="rId33"/>
-    <p:sldId id="302" r:id="rId34"/>
-    <p:sldId id="303" r:id="rId35"/>
-    <p:sldId id="281" r:id="rId36"/>
-    <p:sldId id="283" r:id="rId37"/>
-    <p:sldId id="284" r:id="rId38"/>
-    <p:sldId id="285" r:id="rId39"/>
-    <p:sldId id="286" r:id="rId40"/>
-    <p:sldId id="287" r:id="rId41"/>
-    <p:sldId id="288" r:id="rId42"/>
-    <p:sldId id="289" r:id="rId43"/>
-    <p:sldId id="290" r:id="rId44"/>
-    <p:sldId id="291" r:id="rId45"/>
-    <p:sldId id="292" r:id="rId46"/>
+    <p:sldId id="304" r:id="rId29"/>
+    <p:sldId id="305" r:id="rId30"/>
+    <p:sldId id="306" r:id="rId31"/>
+    <p:sldId id="307" r:id="rId32"/>
+    <p:sldId id="308" r:id="rId33"/>
+    <p:sldId id="309" r:id="rId34"/>
+    <p:sldId id="279" r:id="rId35"/>
+    <p:sldId id="280" r:id="rId36"/>
+    <p:sldId id="310" r:id="rId37"/>
+    <p:sldId id="299" r:id="rId38"/>
+    <p:sldId id="300" r:id="rId39"/>
+    <p:sldId id="301" r:id="rId40"/>
+    <p:sldId id="302" r:id="rId41"/>
+    <p:sldId id="311" r:id="rId42"/>
+    <p:sldId id="303" r:id="rId43"/>
+    <p:sldId id="281" r:id="rId44"/>
+    <p:sldId id="283" r:id="rId45"/>
+    <p:sldId id="284" r:id="rId46"/>
+    <p:sldId id="285" r:id="rId47"/>
+    <p:sldId id="286" r:id="rId48"/>
+    <p:sldId id="287" r:id="rId49"/>
+    <p:sldId id="288" r:id="rId50"/>
+    <p:sldId id="289" r:id="rId51"/>
+    <p:sldId id="290" r:id="rId52"/>
+    <p:sldId id="291" r:id="rId53"/>
+    <p:sldId id="292" r:id="rId54"/>
   </p:sldIdLst>
   <p:sldSz cx="9144000" cy="6858000" type="screen4x3"/>
   <p:notesSz cx="6858000" cy="9144000"/>
@@ -333,7 +341,7 @@
             <a:fld id="{1D8BD707-D9CF-40AE-B4C6-C98DA3205C09}" type="datetimeFigureOut">
               <a:rPr lang="en-US" smtClean="0"/>
               <a:pPr/>
-              <a:t>10/2/2023</a:t>
+              <a:t>10/9/2023</a:t>
             </a:fld>
             <a:endParaRPr lang="en-US"/>
           </a:p>
@@ -500,7 +508,7 @@
             <a:fld id="{1D8BD707-D9CF-40AE-B4C6-C98DA3205C09}" type="datetimeFigureOut">
               <a:rPr lang="en-US" smtClean="0"/>
               <a:pPr/>
-              <a:t>10/2/2023</a:t>
+              <a:t>10/9/2023</a:t>
             </a:fld>
             <a:endParaRPr lang="en-US"/>
           </a:p>
@@ -677,7 +685,7 @@
             <a:fld id="{1D8BD707-D9CF-40AE-B4C6-C98DA3205C09}" type="datetimeFigureOut">
               <a:rPr lang="en-US" smtClean="0"/>
               <a:pPr/>
-              <a:t>10/2/2023</a:t>
+              <a:t>10/9/2023</a:t>
             </a:fld>
             <a:endParaRPr lang="en-US"/>
           </a:p>
@@ -844,7 +852,7 @@
             <a:fld id="{1D8BD707-D9CF-40AE-B4C6-C98DA3205C09}" type="datetimeFigureOut">
               <a:rPr lang="en-US" smtClean="0"/>
               <a:pPr/>
-              <a:t>10/2/2023</a:t>
+              <a:t>10/9/2023</a:t>
             </a:fld>
             <a:endParaRPr lang="en-US"/>
           </a:p>
@@ -1087,7 +1095,7 @@
             <a:fld id="{1D8BD707-D9CF-40AE-B4C6-C98DA3205C09}" type="datetimeFigureOut">
               <a:rPr lang="en-US" smtClean="0"/>
               <a:pPr/>
-              <a:t>10/2/2023</a:t>
+              <a:t>10/9/2023</a:t>
             </a:fld>
             <a:endParaRPr lang="en-US"/>
           </a:p>
@@ -1372,7 +1380,7 @@
             <a:fld id="{1D8BD707-D9CF-40AE-B4C6-C98DA3205C09}" type="datetimeFigureOut">
               <a:rPr lang="en-US" smtClean="0"/>
               <a:pPr/>
-              <a:t>10/2/2023</a:t>
+              <a:t>10/9/2023</a:t>
             </a:fld>
             <a:endParaRPr lang="en-US"/>
           </a:p>
@@ -1791,7 +1799,7 @@
             <a:fld id="{1D8BD707-D9CF-40AE-B4C6-C98DA3205C09}" type="datetimeFigureOut">
               <a:rPr lang="en-US" smtClean="0"/>
               <a:pPr/>
-              <a:t>10/2/2023</a:t>
+              <a:t>10/9/2023</a:t>
             </a:fld>
             <a:endParaRPr lang="en-US"/>
           </a:p>
@@ -1906,7 +1914,7 @@
             <a:fld id="{1D8BD707-D9CF-40AE-B4C6-C98DA3205C09}" type="datetimeFigureOut">
               <a:rPr lang="en-US" smtClean="0"/>
               <a:pPr/>
-              <a:t>10/2/2023</a:t>
+              <a:t>10/9/2023</a:t>
             </a:fld>
             <a:endParaRPr lang="en-US"/>
           </a:p>
@@ -1998,7 +2006,7 @@
             <a:fld id="{1D8BD707-D9CF-40AE-B4C6-C98DA3205C09}" type="datetimeFigureOut">
               <a:rPr lang="en-US" smtClean="0"/>
               <a:pPr/>
-              <a:t>10/2/2023</a:t>
+              <a:t>10/9/2023</a:t>
             </a:fld>
             <a:endParaRPr lang="en-US"/>
           </a:p>
@@ -2272,7 +2280,7 @@
             <a:fld id="{1D8BD707-D9CF-40AE-B4C6-C98DA3205C09}" type="datetimeFigureOut">
               <a:rPr lang="en-US" smtClean="0"/>
               <a:pPr/>
-              <a:t>10/2/2023</a:t>
+              <a:t>10/9/2023</a:t>
             </a:fld>
             <a:endParaRPr lang="en-US"/>
           </a:p>
@@ -2522,7 +2530,7 @@
             <a:fld id="{1D8BD707-D9CF-40AE-B4C6-C98DA3205C09}" type="datetimeFigureOut">
               <a:rPr lang="en-US" smtClean="0"/>
               <a:pPr/>
-              <a:t>10/2/2023</a:t>
+              <a:t>10/9/2023</a:t>
             </a:fld>
             <a:endParaRPr lang="en-US"/>
           </a:p>
@@ -2732,7 +2740,7 @@
             <a:fld id="{1D8BD707-D9CF-40AE-B4C6-C98DA3205C09}" type="datetimeFigureOut">
               <a:rPr lang="en-US" smtClean="0"/>
               <a:pPr/>
-              <a:t>10/2/2023</a:t>
+              <a:t>10/9/2023</a:t>
             </a:fld>
             <a:endParaRPr lang="en-US"/>
           </a:p>
@@ -3939,13 +3947,8 @@
           <a:p>
             <a:r>
               <a:rPr lang="pl-PL" dirty="0" smtClean="0"/>
-              <a:t>Stosuje się do klas lub </a:t>
-            </a:r>
-            <a:r>
-              <a:rPr lang="pl-PL" dirty="0" smtClean="0"/>
-              <a:t>struktur.</a:t>
-            </a:r>
-            <a:endParaRPr lang="pl-PL" dirty="0" smtClean="0"/>
+              <a:t>Stosuje się do klas lub struktur.</a:t>
+            </a:r>
           </a:p>
           <a:p>
             <a:r>
@@ -5204,11 +5207,7 @@
           <a:p>
             <a:r>
               <a:rPr lang="pl-PL" dirty="0" smtClean="0"/>
-              <a:t>Kiedy używać </a:t>
-            </a:r>
-            <a:r>
-              <a:rPr lang="pl-PL" dirty="0" smtClean="0"/>
-              <a:t>Singletona lub konceptu opartego na nim?</a:t>
+              <a:t>Kiedy używać Singletona lub konceptu opartego na nim?</a:t>
             </a:r>
             <a:endParaRPr lang="en-GB" dirty="0"/>
           </a:p>
@@ -5526,47 +5525,19 @@
             <p:ph type="title"/>
           </p:nvPr>
         </p:nvSpPr>
-        <p:spPr/>
-        <p:txBody>
-          <a:bodyPr/>
-          <a:lstStyle/>
-          <a:p>
-            <a:r>
-              <a:rPr lang="pl-PL" dirty="0" smtClean="0"/>
-              <a:t>Pytanie 5</a:t>
-            </a:r>
-            <a:endParaRPr lang="en-GB" dirty="0"/>
-          </a:p>
-        </p:txBody>
-      </p:sp>
-      <p:sp>
-        <p:nvSpPr>
-          <p:cNvPr id="3" name="Content Placeholder 2"/>
-          <p:cNvSpPr>
-            <a:spLocks noGrp="1"/>
-          </p:cNvSpPr>
-          <p:nvPr>
-            <p:ph idx="1"/>
-          </p:nvPr>
-        </p:nvSpPr>
-        <p:spPr/>
-        <p:txBody>
-          <a:bodyPr/>
-          <a:lstStyle/>
-          <a:p>
-            <a:r>
-              <a:rPr lang="pl-PL" dirty="0" smtClean="0"/>
-              <a:t>Czy warto zamykać klasę singletona słowem sealed</a:t>
-            </a:r>
-            <a:r>
-              <a:rPr lang="pl-PL" dirty="0" smtClean="0"/>
-              <a:t>?</a:t>
-            </a:r>
-          </a:p>
-          <a:p>
-            <a:r>
-              <a:rPr lang="pl-PL" dirty="0" smtClean="0"/>
-              <a:t>Kiedy singleton może brać udział w dziedziczeniu?</a:t>
+        <p:spPr>
+          <a:xfrm>
+            <a:off x="304800" y="3200400"/>
+            <a:ext cx="8229600" cy="1143000"/>
+          </a:xfrm>
+        </p:spPr>
+        <p:txBody>
+          <a:bodyPr/>
+          <a:lstStyle/>
+          <a:p>
+            <a:r>
+              <a:rPr lang="pl-PL" dirty="0" smtClean="0"/>
+              <a:t>9/10/23</a:t>
             </a:r>
             <a:endParaRPr lang="en-GB" dirty="0"/>
           </a:p>
@@ -5575,7 +5546,7 @@
     </p:spTree>
     <p:extLst>
       <p:ext uri="{BB962C8B-B14F-4D97-AF65-F5344CB8AC3E}">
-        <p14:creationId xmlns:p14="http://schemas.microsoft.com/office/powerpoint/2010/main" val="2895268897"/>
+        <p14:creationId xmlns:p14="http://schemas.microsoft.com/office/powerpoint/2010/main" val="2407008635"/>
       </p:ext>
     </p:extLst>
   </p:cSld>
@@ -5619,7 +5590,7 @@
           <a:p>
             <a:r>
               <a:rPr lang="pl-PL" dirty="0" smtClean="0"/>
-              <a:t>Odpowiedź 5</a:t>
+              <a:t>Volatile Vs. Lock</a:t>
             </a:r>
             <a:endParaRPr lang="en-GB" dirty="0"/>
           </a:p>
@@ -5642,34 +5613,35 @@
           <a:p>
             <a:r>
               <a:rPr lang="pl-PL" dirty="0" smtClean="0"/>
-              <a:t>Nie jest to obowiązkowe.</a:t>
-            </a:r>
-          </a:p>
-          <a:p>
-            <a:r>
-              <a:rPr lang="pl-PL" dirty="0" smtClean="0"/>
-              <a:t>Słowo sealed pokazuje Twoje intencje co do klasy w sposób jasny.</a:t>
-            </a:r>
-          </a:p>
-          <a:p>
-            <a:r>
-              <a:rPr lang="pl-PL" dirty="0" smtClean="0"/>
-              <a:t>Istnieje jeden specjalny case:</a:t>
+              <a:t>Volatile</a:t>
             </a:r>
           </a:p>
           <a:p>
             <a:pPr lvl="1"/>
             <a:r>
-              <a:rPr lang="en-GB" dirty="0" err="1" smtClean="0"/>
-              <a:t>NestedSingleton.cs</a:t>
-            </a:r>
-            <a:endParaRPr lang="pl-PL" dirty="0" smtClean="0"/>
+              <a:rPr lang="pl-PL" dirty="0" smtClean="0"/>
+              <a:t>Słowo volatile zapewnia widoczność zmiennej do wszystkich wątków</a:t>
+            </a:r>
           </a:p>
           <a:p>
             <a:pPr lvl="1"/>
             <a:r>
               <a:rPr lang="pl-PL" dirty="0" smtClean="0"/>
-              <a:t>Możemy dowolnie tworzyć instancje klasy pochodnej DerivedSingleton</a:t>
+              <a:t>Kompilator wie, że wiele wątków będzie czytać tą zmienną i nie stosuje żadnych optymalizacji</a:t>
+            </a:r>
+          </a:p>
+          <a:p>
+            <a:pPr lvl="1"/>
+            <a:r>
+              <a:rPr lang="pl-PL" dirty="0" smtClean="0"/>
+              <a:t>Wątek uzyskujący dostęp do zmiennej volatile, zawsze czyta ostatnią (najświeższą), kompilator nie przeszadkowuje operacji na tym obszarze pamięci</a:t>
+            </a:r>
+          </a:p>
+          <a:p>
+            <a:pPr lvl="1"/>
+            <a:r>
+              <a:rPr lang="pl-PL" dirty="0" smtClean="0"/>
+              <a:t>Podobnie operacje zapisu nie są reogranizowane</a:t>
             </a:r>
             <a:endParaRPr lang="en-GB" dirty="0"/>
           </a:p>
@@ -5678,7 +5650,7 @@
     </p:spTree>
     <p:extLst>
       <p:ext uri="{BB962C8B-B14F-4D97-AF65-F5344CB8AC3E}">
-        <p14:creationId xmlns:p14="http://schemas.microsoft.com/office/powerpoint/2010/main" val="685443561"/>
+        <p14:creationId xmlns:p14="http://schemas.microsoft.com/office/powerpoint/2010/main" val="2395954015"/>
       </p:ext>
     </p:extLst>
   </p:cSld>
@@ -5803,6 +5775,1036 @@
           <a:lstStyle/>
           <a:p>
             <a:r>
+              <a:rPr lang="pl-PL" dirty="0"/>
+              <a:t>Volatile Vs. Lock</a:t>
+            </a:r>
+            <a:endParaRPr lang="en-GB" dirty="0"/>
+          </a:p>
+        </p:txBody>
+      </p:sp>
+      <p:sp>
+        <p:nvSpPr>
+          <p:cNvPr id="3" name="Content Placeholder 2"/>
+          <p:cNvSpPr>
+            <a:spLocks noGrp="1"/>
+          </p:cNvSpPr>
+          <p:nvPr>
+            <p:ph idx="1"/>
+          </p:nvPr>
+        </p:nvSpPr>
+        <p:spPr/>
+        <p:txBody>
+          <a:bodyPr/>
+          <a:lstStyle/>
+          <a:p>
+            <a:r>
+              <a:rPr lang="pl-PL" dirty="0" smtClean="0"/>
+              <a:t>Volatile:</a:t>
+            </a:r>
+          </a:p>
+          <a:p>
+            <a:pPr lvl="1"/>
+            <a:r>
+              <a:rPr lang="pl-PL" dirty="0" smtClean="0"/>
+              <a:t>Zmiana dokonana przez jeden wątek jest widoczna dla wszystkich innych wątków odczytujących tą zmienną</a:t>
+            </a:r>
+          </a:p>
+          <a:p>
+            <a:pPr lvl="1"/>
+            <a:r>
+              <a:rPr lang="pl-PL" dirty="0" smtClean="0"/>
+              <a:t>Zapewnia widoczność</a:t>
+            </a:r>
+          </a:p>
+          <a:p>
+            <a:pPr lvl="1"/>
+            <a:r>
+              <a:rPr lang="pl-PL" dirty="0" smtClean="0"/>
+              <a:t>Nie zapewnia ochrony przed wyściagami (race conditions)</a:t>
+            </a:r>
+          </a:p>
+          <a:p>
+            <a:pPr lvl="1"/>
+            <a:r>
+              <a:rPr lang="pl-PL" dirty="0" smtClean="0"/>
+              <a:t>Nie zapewnia niezaburzonych operacji read / write</a:t>
+            </a:r>
+          </a:p>
+          <a:p>
+            <a:pPr lvl="1"/>
+            <a:r>
+              <a:rPr lang="pl-PL" dirty="0" smtClean="0"/>
+              <a:t>Nie rozwiązuje problemu konkurencji</a:t>
+            </a:r>
+            <a:endParaRPr lang="en-GB" dirty="0"/>
+          </a:p>
+        </p:txBody>
+      </p:sp>
+    </p:spTree>
+    <p:extLst>
+      <p:ext uri="{BB962C8B-B14F-4D97-AF65-F5344CB8AC3E}">
+        <p14:creationId xmlns:p14="http://schemas.microsoft.com/office/powerpoint/2010/main" val="217424264"/>
+      </p:ext>
+    </p:extLst>
+  </p:cSld>
+  <p:clrMapOvr>
+    <a:masterClrMapping/>
+  </p:clrMapOvr>
+</p:sld>
+</file>
+
+<file path=ppt/slides/slide31.xml><?xml version="1.0" encoding="utf-8"?>
+<p:sld xmlns:a="http://schemas.openxmlformats.org/drawingml/2006/main" xmlns:r="http://schemas.openxmlformats.org/officeDocument/2006/relationships" xmlns:p="http://schemas.openxmlformats.org/presentationml/2006/main">
+  <p:cSld>
+    <p:spTree>
+      <p:nvGrpSpPr>
+        <p:cNvPr id="1" name=""/>
+        <p:cNvGrpSpPr/>
+        <p:nvPr/>
+      </p:nvGrpSpPr>
+      <p:grpSpPr>
+        <a:xfrm>
+          <a:off x="0" y="0"/>
+          <a:ext cx="0" cy="0"/>
+          <a:chOff x="0" y="0"/>
+          <a:chExt cx="0" cy="0"/>
+        </a:xfrm>
+      </p:grpSpPr>
+      <p:sp>
+        <p:nvSpPr>
+          <p:cNvPr id="2" name="Title 1"/>
+          <p:cNvSpPr>
+            <a:spLocks noGrp="1"/>
+          </p:cNvSpPr>
+          <p:nvPr>
+            <p:ph type="title"/>
+          </p:nvPr>
+        </p:nvSpPr>
+        <p:spPr/>
+        <p:txBody>
+          <a:bodyPr/>
+          <a:lstStyle/>
+          <a:p>
+            <a:r>
+              <a:rPr lang="pl-PL" dirty="0"/>
+              <a:t>Volatile Vs. Lock</a:t>
+            </a:r>
+            <a:endParaRPr lang="en-GB" dirty="0"/>
+          </a:p>
+        </p:txBody>
+      </p:sp>
+      <p:sp>
+        <p:nvSpPr>
+          <p:cNvPr id="3" name="Content Placeholder 2"/>
+          <p:cNvSpPr>
+            <a:spLocks noGrp="1"/>
+          </p:cNvSpPr>
+          <p:nvPr>
+            <p:ph idx="1"/>
+          </p:nvPr>
+        </p:nvSpPr>
+        <p:spPr/>
+        <p:txBody>
+          <a:bodyPr/>
+          <a:lstStyle/>
+          <a:p>
+            <a:r>
+              <a:rPr lang="pl-PL" dirty="0" smtClean="0"/>
+              <a:t>Lock</a:t>
+            </a:r>
+          </a:p>
+          <a:p>
+            <a:pPr lvl="1"/>
+            <a:r>
+              <a:rPr lang="pl-PL" dirty="0" smtClean="0"/>
+              <a:t>Mechanism, który zezwala tylko jednemu wątkowi wykonywać dany blok kodu</a:t>
+            </a:r>
+          </a:p>
+          <a:p>
+            <a:pPr lvl="1"/>
+            <a:r>
+              <a:rPr lang="pl-PL" dirty="0" smtClean="0"/>
+              <a:t>Dopóki wątek jest w tym bloku, żaden inny wątek się do niego nie dostanie – wątki muszą czekać na swoją kolej</a:t>
+            </a:r>
+          </a:p>
+          <a:p>
+            <a:pPr lvl="1"/>
+            <a:r>
+              <a:rPr lang="pl-PL" dirty="0" smtClean="0"/>
+              <a:t>Lock nie rozróżnia pomiędzy wątkami pochodzącymi z Task-ów a utworzonymi za pomocą klasy Thread – Task Agnosticity</a:t>
+            </a:r>
+          </a:p>
+          <a:p>
+            <a:pPr lvl="1"/>
+            <a:endParaRPr lang="en-GB" dirty="0"/>
+          </a:p>
+        </p:txBody>
+      </p:sp>
+    </p:spTree>
+    <p:extLst>
+      <p:ext uri="{BB962C8B-B14F-4D97-AF65-F5344CB8AC3E}">
+        <p14:creationId xmlns:p14="http://schemas.microsoft.com/office/powerpoint/2010/main" val="2614896473"/>
+      </p:ext>
+    </p:extLst>
+  </p:cSld>
+  <p:clrMapOvr>
+    <a:masterClrMapping/>
+  </p:clrMapOvr>
+</p:sld>
+</file>
+
+<file path=ppt/slides/slide32.xml><?xml version="1.0" encoding="utf-8"?>
+<p:sld xmlns:a="http://schemas.openxmlformats.org/drawingml/2006/main" xmlns:r="http://schemas.openxmlformats.org/officeDocument/2006/relationships" xmlns:p="http://schemas.openxmlformats.org/presentationml/2006/main">
+  <p:cSld>
+    <p:spTree>
+      <p:nvGrpSpPr>
+        <p:cNvPr id="1" name=""/>
+        <p:cNvGrpSpPr/>
+        <p:nvPr/>
+      </p:nvGrpSpPr>
+      <p:grpSpPr>
+        <a:xfrm>
+          <a:off x="0" y="0"/>
+          <a:ext cx="0" cy="0"/>
+          <a:chOff x="0" y="0"/>
+          <a:chExt cx="0" cy="0"/>
+        </a:xfrm>
+      </p:grpSpPr>
+      <p:sp>
+        <p:nvSpPr>
+          <p:cNvPr id="2" name="Title 1"/>
+          <p:cNvSpPr>
+            <a:spLocks noGrp="1"/>
+          </p:cNvSpPr>
+          <p:nvPr>
+            <p:ph type="title"/>
+          </p:nvPr>
+        </p:nvSpPr>
+        <p:spPr/>
+        <p:txBody>
+          <a:bodyPr/>
+          <a:lstStyle/>
+          <a:p>
+            <a:r>
+              <a:rPr lang="pl-PL" dirty="0" smtClean="0"/>
+              <a:t>Lock vs. Interlocked</a:t>
+            </a:r>
+            <a:endParaRPr lang="en-GB" dirty="0"/>
+          </a:p>
+        </p:txBody>
+      </p:sp>
+      <p:sp>
+        <p:nvSpPr>
+          <p:cNvPr id="3" name="Content Placeholder 2"/>
+          <p:cNvSpPr>
+            <a:spLocks noGrp="1"/>
+          </p:cNvSpPr>
+          <p:nvPr>
+            <p:ph idx="1"/>
+          </p:nvPr>
+        </p:nvSpPr>
+        <p:spPr/>
+        <p:txBody>
+          <a:bodyPr/>
+          <a:lstStyle/>
+          <a:p>
+            <a:r>
+              <a:rPr lang="pl-PL" dirty="0" smtClean="0"/>
+              <a:t>Lock eliminuje problem „race conditions”, jest jednak dość kosztowny ze względu na blokowanie i zwalnianie zasobów</a:t>
+            </a:r>
+          </a:p>
+          <a:p>
+            <a:r>
+              <a:rPr lang="pl-PL" dirty="0" smtClean="0"/>
+              <a:t>Klasa Interlocked pozwala na wykonywanie podstawowych operacji (Increment, Decrement, Add, Exchange)</a:t>
+            </a:r>
+          </a:p>
+          <a:p>
+            <a:r>
+              <a:rPr lang="pl-PL" dirty="0" smtClean="0"/>
+              <a:t>Wykorzystywany jest mechanizm procesora, operacje są atomiczne</a:t>
+            </a:r>
+            <a:endParaRPr lang="en-GB" dirty="0"/>
+          </a:p>
+        </p:txBody>
+      </p:sp>
+    </p:spTree>
+    <p:extLst>
+      <p:ext uri="{BB962C8B-B14F-4D97-AF65-F5344CB8AC3E}">
+        <p14:creationId xmlns:p14="http://schemas.microsoft.com/office/powerpoint/2010/main" val="2140068643"/>
+      </p:ext>
+    </p:extLst>
+  </p:cSld>
+  <p:clrMapOvr>
+    <a:masterClrMapping/>
+  </p:clrMapOvr>
+</p:sld>
+</file>
+
+<file path=ppt/slides/slide33.xml><?xml version="1.0" encoding="utf-8"?>
+<p:sld xmlns:a="http://schemas.openxmlformats.org/drawingml/2006/main" xmlns:r="http://schemas.openxmlformats.org/officeDocument/2006/relationships" xmlns:p="http://schemas.openxmlformats.org/presentationml/2006/main">
+  <p:cSld>
+    <p:spTree>
+      <p:nvGrpSpPr>
+        <p:cNvPr id="1" name=""/>
+        <p:cNvGrpSpPr/>
+        <p:nvPr/>
+      </p:nvGrpSpPr>
+      <p:grpSpPr>
+        <a:xfrm>
+          <a:off x="0" y="0"/>
+          <a:ext cx="0" cy="0"/>
+          <a:chOff x="0" y="0"/>
+          <a:chExt cx="0" cy="0"/>
+        </a:xfrm>
+      </p:grpSpPr>
+      <p:sp>
+        <p:nvSpPr>
+          <p:cNvPr id="2" name="Title 1"/>
+          <p:cNvSpPr>
+            <a:spLocks noGrp="1"/>
+          </p:cNvSpPr>
+          <p:nvPr>
+            <p:ph type="title"/>
+          </p:nvPr>
+        </p:nvSpPr>
+        <p:spPr/>
+        <p:txBody>
+          <a:bodyPr/>
+          <a:lstStyle/>
+          <a:p>
+            <a:r>
+              <a:rPr lang="pl-PL" dirty="0" smtClean="0"/>
+              <a:t>Volatile vs. Lock vs. Interlocked</a:t>
+            </a:r>
+            <a:endParaRPr lang="en-GB" dirty="0"/>
+          </a:p>
+        </p:txBody>
+      </p:sp>
+      <p:graphicFrame>
+        <p:nvGraphicFramePr>
+          <p:cNvPr id="4" name="Content Placeholder 3"/>
+          <p:cNvGraphicFramePr>
+            <a:graphicFrameLocks noGrp="1"/>
+          </p:cNvGraphicFramePr>
+          <p:nvPr>
+            <p:ph idx="1"/>
+            <p:extLst>
+              <p:ext uri="{D42A27DB-BD31-4B8C-83A1-F6EECF244321}">
+                <p14:modId xmlns:p14="http://schemas.microsoft.com/office/powerpoint/2010/main" val="2846675684"/>
+              </p:ext>
+            </p:extLst>
+          </p:nvPr>
+        </p:nvGraphicFramePr>
+        <p:xfrm>
+          <a:off x="457200" y="1600200"/>
+          <a:ext cx="8458200" cy="3484880"/>
+        </p:xfrm>
+        <a:graphic>
+          <a:graphicData uri="http://schemas.openxmlformats.org/drawingml/2006/table">
+            <a:tbl>
+              <a:tblPr firstRow="1" bandRow="1">
+                <a:tableStyleId>{5C22544A-7EE6-4342-B048-85BDC9FD1C3A}</a:tableStyleId>
+              </a:tblPr>
+              <a:tblGrid>
+                <a:gridCol w="1295400"/>
+                <a:gridCol w="2933700"/>
+                <a:gridCol w="2114550"/>
+                <a:gridCol w="2114550"/>
+              </a:tblGrid>
+              <a:tr h="370840">
+                <a:tc>
+                  <a:txBody>
+                    <a:bodyPr/>
+                    <a:lstStyle/>
+                    <a:p>
+                      <a:endParaRPr lang="en-GB" dirty="0"/>
+                    </a:p>
+                  </a:txBody>
+                  <a:tcPr/>
+                </a:tc>
+                <a:tc>
+                  <a:txBody>
+                    <a:bodyPr/>
+                    <a:lstStyle/>
+                    <a:p>
+                      <a:r>
+                        <a:rPr lang="pl-PL" dirty="0" smtClean="0"/>
+                        <a:t>Volatile</a:t>
+                      </a:r>
+                      <a:endParaRPr lang="en-GB" dirty="0"/>
+                    </a:p>
+                  </a:txBody>
+                  <a:tcPr/>
+                </a:tc>
+                <a:tc>
+                  <a:txBody>
+                    <a:bodyPr/>
+                    <a:lstStyle/>
+                    <a:p>
+                      <a:r>
+                        <a:rPr lang="pl-PL" dirty="0" smtClean="0"/>
+                        <a:t>Lock</a:t>
+                      </a:r>
+                      <a:endParaRPr lang="en-GB" dirty="0"/>
+                    </a:p>
+                  </a:txBody>
+                  <a:tcPr/>
+                </a:tc>
+                <a:tc>
+                  <a:txBody>
+                    <a:bodyPr/>
+                    <a:lstStyle/>
+                    <a:p>
+                      <a:r>
+                        <a:rPr lang="pl-PL" dirty="0" smtClean="0"/>
+                        <a:t>Interlocked</a:t>
+                      </a:r>
+                      <a:endParaRPr lang="en-GB" dirty="0"/>
+                    </a:p>
+                  </a:txBody>
+                  <a:tcPr/>
+                </a:tc>
+              </a:tr>
+              <a:tr h="370840">
+                <a:tc>
+                  <a:txBody>
+                    <a:bodyPr/>
+                    <a:lstStyle/>
+                    <a:p>
+                      <a:r>
+                        <a:rPr lang="pl-PL" dirty="0" smtClean="0"/>
+                        <a:t>What it does: </a:t>
+                      </a:r>
+                      <a:endParaRPr lang="en-GB" dirty="0"/>
+                    </a:p>
+                  </a:txBody>
+                  <a:tcPr/>
+                </a:tc>
+                <a:tc>
+                  <a:txBody>
+                    <a:bodyPr/>
+                    <a:lstStyle/>
+                    <a:p>
+                      <a:r>
+                        <a:rPr lang="pl-PL" dirty="0" smtClean="0"/>
+                        <a:t>ensures the visibility</a:t>
+                      </a:r>
+                      <a:r>
+                        <a:rPr lang="pl-PL" baseline="0" dirty="0" smtClean="0"/>
+                        <a:t> of a variable</a:t>
+                      </a:r>
+                      <a:endParaRPr lang="en-GB" dirty="0"/>
+                    </a:p>
+                  </a:txBody>
+                  <a:tcPr/>
+                </a:tc>
+                <a:tc>
+                  <a:txBody>
+                    <a:bodyPr/>
+                    <a:lstStyle/>
+                    <a:p>
+                      <a:r>
+                        <a:rPr lang="pl-PL" dirty="0" smtClean="0"/>
+                        <a:t>mutual</a:t>
+                      </a:r>
+                      <a:r>
+                        <a:rPr lang="pl-PL" baseline="0" dirty="0" smtClean="0"/>
+                        <a:t> exclusion, thread safety</a:t>
+                      </a:r>
+                      <a:endParaRPr lang="en-GB" dirty="0"/>
+                    </a:p>
+                  </a:txBody>
+                  <a:tcPr/>
+                </a:tc>
+                <a:tc>
+                  <a:txBody>
+                    <a:bodyPr/>
+                    <a:lstStyle/>
+                    <a:p>
+                      <a:r>
+                        <a:rPr lang="pl-PL" dirty="0" smtClean="0"/>
+                        <a:t>thread safety</a:t>
+                      </a:r>
+                      <a:r>
+                        <a:rPr lang="pl-PL" baseline="0" dirty="0" smtClean="0"/>
+                        <a:t> with good performance</a:t>
+                      </a:r>
+                      <a:endParaRPr lang="en-GB" dirty="0"/>
+                    </a:p>
+                  </a:txBody>
+                  <a:tcPr/>
+                </a:tc>
+              </a:tr>
+              <a:tr h="370840">
+                <a:tc>
+                  <a:txBody>
+                    <a:bodyPr/>
+                    <a:lstStyle/>
+                    <a:p>
+                      <a:r>
+                        <a:rPr lang="pl-PL" dirty="0" smtClean="0"/>
+                        <a:t>What it does not do: </a:t>
+                      </a:r>
+                      <a:endParaRPr lang="en-GB" dirty="0"/>
+                    </a:p>
+                  </a:txBody>
+                  <a:tcPr/>
+                </a:tc>
+                <a:tc>
+                  <a:txBody>
+                    <a:bodyPr/>
+                    <a:lstStyle/>
+                    <a:p>
+                      <a:r>
+                        <a:rPr lang="pl-PL" dirty="0" smtClean="0"/>
+                        <a:t>does not prevent concurrent modifications by multiple</a:t>
+                      </a:r>
+                      <a:r>
+                        <a:rPr lang="pl-PL" baseline="0" dirty="0" smtClean="0"/>
+                        <a:t> threads</a:t>
+                      </a:r>
+                      <a:endParaRPr lang="en-GB" dirty="0"/>
+                    </a:p>
+                  </a:txBody>
+                  <a:tcPr/>
+                </a:tc>
+                <a:tc>
+                  <a:txBody>
+                    <a:bodyPr/>
+                    <a:lstStyle/>
+                    <a:p>
+                      <a:endParaRPr lang="en-GB" dirty="0"/>
+                    </a:p>
+                  </a:txBody>
+                  <a:tcPr/>
+                </a:tc>
+                <a:tc>
+                  <a:txBody>
+                    <a:bodyPr/>
+                    <a:lstStyle/>
+                    <a:p>
+                      <a:endParaRPr lang="en-GB" dirty="0"/>
+                    </a:p>
+                  </a:txBody>
+                  <a:tcPr/>
+                </a:tc>
+              </a:tr>
+              <a:tr h="370840">
+                <a:tc>
+                  <a:txBody>
+                    <a:bodyPr/>
+                    <a:lstStyle/>
+                    <a:p>
+                      <a:r>
+                        <a:rPr lang="pl-PL" dirty="0" smtClean="0"/>
+                        <a:t>Best at:</a:t>
+                      </a:r>
+                      <a:endParaRPr lang="en-GB" dirty="0"/>
+                    </a:p>
+                  </a:txBody>
+                  <a:tcPr/>
+                </a:tc>
+                <a:tc>
+                  <a:txBody>
+                    <a:bodyPr/>
+                    <a:lstStyle/>
+                    <a:p>
+                      <a:r>
+                        <a:rPr lang="pl-PL" dirty="0" smtClean="0"/>
+                        <a:t>a</a:t>
+                      </a:r>
+                      <a:r>
+                        <a:rPr lang="pl-PL" baseline="0" dirty="0" smtClean="0"/>
+                        <a:t> shared resource visibile to all threads</a:t>
+                      </a:r>
+                      <a:endParaRPr lang="en-GB" dirty="0"/>
+                    </a:p>
+                  </a:txBody>
+                  <a:tcPr/>
+                </a:tc>
+                <a:tc>
+                  <a:txBody>
+                    <a:bodyPr/>
+                    <a:lstStyle/>
+                    <a:p>
+                      <a:r>
+                        <a:rPr lang="pl-PL" dirty="0" smtClean="0"/>
+                        <a:t>only one thread</a:t>
+                      </a:r>
+                      <a:r>
+                        <a:rPr lang="pl-PL" baseline="0" dirty="0" smtClean="0"/>
+                        <a:t> a time to access a shared resource</a:t>
+                      </a:r>
+                      <a:endParaRPr lang="en-GB" dirty="0"/>
+                    </a:p>
+                  </a:txBody>
+                  <a:tcPr/>
+                </a:tc>
+                <a:tc>
+                  <a:txBody>
+                    <a:bodyPr/>
+                    <a:lstStyle/>
+                    <a:p>
+                      <a:r>
+                        <a:rPr lang="pl-PL" dirty="0" smtClean="0"/>
+                        <a:t>basic </a:t>
+                      </a:r>
+                      <a:r>
+                        <a:rPr lang="en-GB" sz="1800" b="0" i="0" kern="1200" dirty="0" smtClean="0">
+                          <a:solidFill>
+                            <a:schemeClr val="dk1"/>
+                          </a:solidFill>
+                          <a:effectLst/>
+                          <a:latin typeface="+mn-lt"/>
+                          <a:ea typeface="+mn-ea"/>
+                          <a:cs typeface="+mn-cs"/>
+                        </a:rPr>
+                        <a:t>arithmetic </a:t>
+                      </a:r>
+                      <a:endParaRPr lang="pl-PL" sz="1800" b="0" i="0" kern="1200" dirty="0" smtClean="0">
+                        <a:solidFill>
+                          <a:schemeClr val="dk1"/>
+                        </a:solidFill>
+                        <a:effectLst/>
+                        <a:latin typeface="+mn-lt"/>
+                        <a:ea typeface="+mn-ea"/>
+                        <a:cs typeface="+mn-cs"/>
+                      </a:endParaRPr>
+                    </a:p>
+                    <a:p>
+                      <a:r>
+                        <a:rPr lang="pl-PL" dirty="0" smtClean="0"/>
+                        <a:t>operations,</a:t>
+                      </a:r>
+                    </a:p>
+                    <a:p>
+                      <a:r>
+                        <a:rPr lang="pl-PL" dirty="0" smtClean="0"/>
+                        <a:t>updating</a:t>
+                      </a:r>
+                      <a:r>
+                        <a:rPr lang="pl-PL" baseline="0" dirty="0" smtClean="0"/>
+                        <a:t> counters, updating flags</a:t>
+                      </a:r>
+                      <a:endParaRPr lang="en-GB" dirty="0"/>
+                    </a:p>
+                  </a:txBody>
+                  <a:tcPr/>
+                </a:tc>
+              </a:tr>
+              <a:tr h="370840">
+                <a:tc>
+                  <a:txBody>
+                    <a:bodyPr/>
+                    <a:lstStyle/>
+                    <a:p>
+                      <a:r>
+                        <a:rPr lang="pl-PL" dirty="0" smtClean="0"/>
+                        <a:t>Operations</a:t>
+                      </a:r>
+                      <a:endParaRPr lang="en-GB" dirty="0"/>
+                    </a:p>
+                  </a:txBody>
+                  <a:tcPr/>
+                </a:tc>
+                <a:tc>
+                  <a:txBody>
+                    <a:bodyPr/>
+                    <a:lstStyle/>
+                    <a:p>
+                      <a:r>
+                        <a:rPr lang="pl-PL" dirty="0" smtClean="0"/>
+                        <a:t>simple</a:t>
+                      </a:r>
+                      <a:endParaRPr lang="en-GB" dirty="0"/>
+                    </a:p>
+                  </a:txBody>
+                  <a:tcPr/>
+                </a:tc>
+                <a:tc>
+                  <a:txBody>
+                    <a:bodyPr/>
+                    <a:lstStyle/>
+                    <a:p>
+                      <a:r>
+                        <a:rPr lang="pl-PL" baseline="0" dirty="0" smtClean="0"/>
+                        <a:t>complex</a:t>
+                      </a:r>
+                      <a:endParaRPr lang="en-GB" dirty="0"/>
+                    </a:p>
+                  </a:txBody>
+                  <a:tcPr/>
+                </a:tc>
+                <a:tc>
+                  <a:txBody>
+                    <a:bodyPr/>
+                    <a:lstStyle/>
+                    <a:p>
+                      <a:r>
+                        <a:rPr lang="pl-PL" dirty="0" smtClean="0"/>
+                        <a:t>basic </a:t>
+                      </a:r>
+                      <a:r>
+                        <a:rPr lang="pl-PL" b="1" dirty="0" smtClean="0"/>
+                        <a:t>arthimetic</a:t>
+                      </a:r>
+                      <a:endParaRPr lang="en-GB" b="1" dirty="0"/>
+                    </a:p>
+                  </a:txBody>
+                  <a:tcPr/>
+                </a:tc>
+              </a:tr>
+            </a:tbl>
+          </a:graphicData>
+        </a:graphic>
+      </p:graphicFrame>
+    </p:spTree>
+    <p:extLst>
+      <p:ext uri="{BB962C8B-B14F-4D97-AF65-F5344CB8AC3E}">
+        <p14:creationId xmlns:p14="http://schemas.microsoft.com/office/powerpoint/2010/main" val="167047870"/>
+      </p:ext>
+    </p:extLst>
+  </p:cSld>
+  <p:clrMapOvr>
+    <a:masterClrMapping/>
+  </p:clrMapOvr>
+</p:sld>
+</file>
+
+<file path=ppt/slides/slide34.xml><?xml version="1.0" encoding="utf-8"?>
+<p:sld xmlns:a="http://schemas.openxmlformats.org/drawingml/2006/main" xmlns:r="http://schemas.openxmlformats.org/officeDocument/2006/relationships" xmlns:p="http://schemas.openxmlformats.org/presentationml/2006/main">
+  <p:cSld>
+    <p:spTree>
+      <p:nvGrpSpPr>
+        <p:cNvPr id="1" name=""/>
+        <p:cNvGrpSpPr/>
+        <p:nvPr/>
+      </p:nvGrpSpPr>
+      <p:grpSpPr>
+        <a:xfrm>
+          <a:off x="0" y="0"/>
+          <a:ext cx="0" cy="0"/>
+          <a:chOff x="0" y="0"/>
+          <a:chExt cx="0" cy="0"/>
+        </a:xfrm>
+      </p:grpSpPr>
+      <p:sp>
+        <p:nvSpPr>
+          <p:cNvPr id="2" name="Title 1"/>
+          <p:cNvSpPr>
+            <a:spLocks noGrp="1"/>
+          </p:cNvSpPr>
+          <p:nvPr>
+            <p:ph type="title"/>
+          </p:nvPr>
+        </p:nvSpPr>
+        <p:spPr/>
+        <p:txBody>
+          <a:bodyPr/>
+          <a:lstStyle/>
+          <a:p>
+            <a:r>
+              <a:rPr lang="pl-PL" dirty="0" smtClean="0"/>
+              <a:t>Pytanie 5</a:t>
+            </a:r>
+            <a:endParaRPr lang="en-GB" dirty="0"/>
+          </a:p>
+        </p:txBody>
+      </p:sp>
+      <p:sp>
+        <p:nvSpPr>
+          <p:cNvPr id="3" name="Content Placeholder 2"/>
+          <p:cNvSpPr>
+            <a:spLocks noGrp="1"/>
+          </p:cNvSpPr>
+          <p:nvPr>
+            <p:ph idx="1"/>
+          </p:nvPr>
+        </p:nvSpPr>
+        <p:spPr/>
+        <p:txBody>
+          <a:bodyPr/>
+          <a:lstStyle/>
+          <a:p>
+            <a:r>
+              <a:rPr lang="pl-PL" dirty="0" smtClean="0"/>
+              <a:t>Czy warto zamykać klasę singletona słowem sealed?</a:t>
+            </a:r>
+          </a:p>
+          <a:p>
+            <a:r>
+              <a:rPr lang="pl-PL" dirty="0" smtClean="0"/>
+              <a:t>Kiedy singleton może brać udział w dziedziczeniu?</a:t>
+            </a:r>
+            <a:endParaRPr lang="en-GB" dirty="0"/>
+          </a:p>
+        </p:txBody>
+      </p:sp>
+    </p:spTree>
+    <p:extLst>
+      <p:ext uri="{BB962C8B-B14F-4D97-AF65-F5344CB8AC3E}">
+        <p14:creationId xmlns:p14="http://schemas.microsoft.com/office/powerpoint/2010/main" val="2895268897"/>
+      </p:ext>
+    </p:extLst>
+  </p:cSld>
+  <p:clrMapOvr>
+    <a:masterClrMapping/>
+  </p:clrMapOvr>
+</p:sld>
+</file>
+
+<file path=ppt/slides/slide35.xml><?xml version="1.0" encoding="utf-8"?>
+<p:sld xmlns:a="http://schemas.openxmlformats.org/drawingml/2006/main" xmlns:r="http://schemas.openxmlformats.org/officeDocument/2006/relationships" xmlns:p="http://schemas.openxmlformats.org/presentationml/2006/main">
+  <p:cSld>
+    <p:spTree>
+      <p:nvGrpSpPr>
+        <p:cNvPr id="1" name=""/>
+        <p:cNvGrpSpPr/>
+        <p:nvPr/>
+      </p:nvGrpSpPr>
+      <p:grpSpPr>
+        <a:xfrm>
+          <a:off x="0" y="0"/>
+          <a:ext cx="0" cy="0"/>
+          <a:chOff x="0" y="0"/>
+          <a:chExt cx="0" cy="0"/>
+        </a:xfrm>
+      </p:grpSpPr>
+      <p:sp>
+        <p:nvSpPr>
+          <p:cNvPr id="2" name="Title 1"/>
+          <p:cNvSpPr>
+            <a:spLocks noGrp="1"/>
+          </p:cNvSpPr>
+          <p:nvPr>
+            <p:ph type="title"/>
+          </p:nvPr>
+        </p:nvSpPr>
+        <p:spPr/>
+        <p:txBody>
+          <a:bodyPr/>
+          <a:lstStyle/>
+          <a:p>
+            <a:r>
+              <a:rPr lang="pl-PL" dirty="0" smtClean="0"/>
+              <a:t>Odpowiedź 5</a:t>
+            </a:r>
+            <a:endParaRPr lang="en-GB" dirty="0"/>
+          </a:p>
+        </p:txBody>
+      </p:sp>
+      <p:sp>
+        <p:nvSpPr>
+          <p:cNvPr id="3" name="Content Placeholder 2"/>
+          <p:cNvSpPr>
+            <a:spLocks noGrp="1"/>
+          </p:cNvSpPr>
+          <p:nvPr>
+            <p:ph idx="1"/>
+          </p:nvPr>
+        </p:nvSpPr>
+        <p:spPr/>
+        <p:txBody>
+          <a:bodyPr/>
+          <a:lstStyle/>
+          <a:p>
+            <a:r>
+              <a:rPr lang="pl-PL" dirty="0" smtClean="0"/>
+              <a:t>Nie jest to obowiązkowe.</a:t>
+            </a:r>
+          </a:p>
+          <a:p>
+            <a:r>
+              <a:rPr lang="pl-PL" dirty="0" smtClean="0"/>
+              <a:t>Słowo sealed pokazuje Twoje intencje co do klasy w sposób jasny.</a:t>
+            </a:r>
+          </a:p>
+          <a:p>
+            <a:r>
+              <a:rPr lang="pl-PL" dirty="0" smtClean="0"/>
+              <a:t>Istnieje jeden specjalny case:</a:t>
+            </a:r>
+          </a:p>
+          <a:p>
+            <a:pPr lvl="1"/>
+            <a:r>
+              <a:rPr lang="en-GB" dirty="0" err="1" smtClean="0"/>
+              <a:t>NestedSingleton.cs</a:t>
+            </a:r>
+            <a:endParaRPr lang="pl-PL" dirty="0" smtClean="0"/>
+          </a:p>
+          <a:p>
+            <a:pPr lvl="1"/>
+            <a:r>
+              <a:rPr lang="pl-PL" dirty="0" smtClean="0"/>
+              <a:t>Możemy dowolnie tworzyć instancje klasy pochodnej DerivedSingleton</a:t>
+            </a:r>
+            <a:endParaRPr lang="en-GB" dirty="0"/>
+          </a:p>
+        </p:txBody>
+      </p:sp>
+    </p:spTree>
+    <p:extLst>
+      <p:ext uri="{BB962C8B-B14F-4D97-AF65-F5344CB8AC3E}">
+        <p14:creationId xmlns:p14="http://schemas.microsoft.com/office/powerpoint/2010/main" val="685443561"/>
+      </p:ext>
+    </p:extLst>
+  </p:cSld>
+  <p:clrMapOvr>
+    <a:masterClrMapping/>
+  </p:clrMapOvr>
+</p:sld>
+</file>
+
+<file path=ppt/slides/slide36.xml><?xml version="1.0" encoding="utf-8"?>
+<p:sld xmlns:a="http://schemas.openxmlformats.org/drawingml/2006/main" xmlns:r="http://schemas.openxmlformats.org/officeDocument/2006/relationships" xmlns:p="http://schemas.openxmlformats.org/presentationml/2006/main">
+  <p:cSld>
+    <p:spTree>
+      <p:nvGrpSpPr>
+        <p:cNvPr id="1" name=""/>
+        <p:cNvGrpSpPr/>
+        <p:nvPr/>
+      </p:nvGrpSpPr>
+      <p:grpSpPr>
+        <a:xfrm>
+          <a:off x="0" y="0"/>
+          <a:ext cx="0" cy="0"/>
+          <a:chOff x="0" y="0"/>
+          <a:chExt cx="0" cy="0"/>
+        </a:xfrm>
+      </p:grpSpPr>
+      <p:sp>
+        <p:nvSpPr>
+          <p:cNvPr id="2" name="Title 1"/>
+          <p:cNvSpPr>
+            <a:spLocks noGrp="1"/>
+          </p:cNvSpPr>
+          <p:nvPr>
+            <p:ph type="title"/>
+          </p:nvPr>
+        </p:nvSpPr>
+        <p:spPr/>
+        <p:txBody>
+          <a:bodyPr>
+            <a:normAutofit fontScale="90000"/>
+          </a:bodyPr>
+          <a:lstStyle/>
+          <a:p>
+            <a:r>
+              <a:rPr lang="pl-PL" dirty="0" smtClean="0"/>
+              <a:t>Performance benefits of sealed classes</a:t>
+            </a:r>
+            <a:endParaRPr lang="en-GB" dirty="0"/>
+          </a:p>
+        </p:txBody>
+      </p:sp>
+      <p:sp>
+        <p:nvSpPr>
+          <p:cNvPr id="3" name="Content Placeholder 2"/>
+          <p:cNvSpPr>
+            <a:spLocks noGrp="1"/>
+          </p:cNvSpPr>
+          <p:nvPr>
+            <p:ph idx="1"/>
+          </p:nvPr>
+        </p:nvSpPr>
+        <p:spPr/>
+        <p:txBody>
+          <a:bodyPr/>
+          <a:lstStyle/>
+          <a:p>
+            <a:r>
+              <a:rPr lang="pl-PL" dirty="0"/>
+              <a:t>W</a:t>
+            </a:r>
+            <a:r>
+              <a:rPr lang="en-US" dirty="0" smtClean="0"/>
+              <a:t>hen </a:t>
+            </a:r>
+            <a:r>
+              <a:rPr lang="en-US" dirty="0"/>
+              <a:t>a class is </a:t>
+            </a:r>
+            <a:r>
+              <a:rPr lang="en-US" dirty="0"/>
+              <a:t>sealed</a:t>
+            </a:r>
+            <a:r>
+              <a:rPr lang="en-US" dirty="0"/>
+              <a:t> the JIT can apply optimizations and </a:t>
+            </a:r>
+            <a:r>
+              <a:rPr lang="en-US" i="1" dirty="0"/>
+              <a:t>slightly</a:t>
+            </a:r>
+            <a:r>
+              <a:rPr lang="en-US" dirty="0"/>
+              <a:t> improve the performance of the </a:t>
+            </a:r>
+            <a:r>
+              <a:rPr lang="en-US" dirty="0" smtClean="0"/>
+              <a:t>application</a:t>
+            </a:r>
+            <a:endParaRPr lang="pl-PL" dirty="0" smtClean="0"/>
+          </a:p>
+          <a:p>
+            <a:r>
+              <a:rPr lang="pl-PL" dirty="0" smtClean="0"/>
+              <a:t>Topic to be continued!</a:t>
+            </a:r>
+          </a:p>
+          <a:p>
+            <a:endParaRPr lang="en-GB" dirty="0"/>
+          </a:p>
+        </p:txBody>
+      </p:sp>
+    </p:spTree>
+    <p:extLst>
+      <p:ext uri="{BB962C8B-B14F-4D97-AF65-F5344CB8AC3E}">
+        <p14:creationId xmlns:p14="http://schemas.microsoft.com/office/powerpoint/2010/main" val="1345895757"/>
+      </p:ext>
+    </p:extLst>
+  </p:cSld>
+  <p:clrMapOvr>
+    <a:masterClrMapping/>
+  </p:clrMapOvr>
+</p:sld>
+</file>
+
+<file path=ppt/slides/slide37.xml><?xml version="1.0" encoding="utf-8"?>
+<p:sld xmlns:a="http://schemas.openxmlformats.org/drawingml/2006/main" xmlns:r="http://schemas.openxmlformats.org/officeDocument/2006/relationships" xmlns:p="http://schemas.openxmlformats.org/presentationml/2006/main">
+  <p:cSld>
+    <p:spTree>
+      <p:nvGrpSpPr>
+        <p:cNvPr id="1" name=""/>
+        <p:cNvGrpSpPr/>
+        <p:nvPr/>
+      </p:nvGrpSpPr>
+      <p:grpSpPr>
+        <a:xfrm>
+          <a:off x="0" y="0"/>
+          <a:ext cx="0" cy="0"/>
+          <a:chOff x="0" y="0"/>
+          <a:chExt cx="0" cy="0"/>
+        </a:xfrm>
+      </p:grpSpPr>
+      <p:sp>
+        <p:nvSpPr>
+          <p:cNvPr id="2" name="Title 1"/>
+          <p:cNvSpPr>
+            <a:spLocks noGrp="1"/>
+          </p:cNvSpPr>
+          <p:nvPr>
+            <p:ph type="title"/>
+          </p:nvPr>
+        </p:nvSpPr>
+        <p:spPr/>
+        <p:txBody>
+          <a:bodyPr/>
+          <a:lstStyle/>
+          <a:p>
+            <a:r>
               <a:rPr lang="pl-PL" dirty="0" smtClean="0"/>
               <a:t>Singleton with Static Property</a:t>
             </a:r>
@@ -5849,7 +6851,7 @@
 </p:sld>
 </file>
 
-<file path=ppt/slides/slide31.xml><?xml version="1.0" encoding="utf-8"?>
+<file path=ppt/slides/slide38.xml><?xml version="1.0" encoding="utf-8"?>
 <p:sld xmlns:a="http://schemas.openxmlformats.org/drawingml/2006/main" xmlns:r="http://schemas.openxmlformats.org/officeDocument/2006/relationships" xmlns:p="http://schemas.openxmlformats.org/presentationml/2006/main">
   <p:cSld>
     <p:spTree>
@@ -5966,7 +6968,7 @@
 </p:sld>
 </file>
 
-<file path=ppt/slides/slide32.xml><?xml version="1.0" encoding="utf-8"?>
+<file path=ppt/slides/slide39.xml><?xml version="1.0" encoding="utf-8"?>
 <p:sld xmlns:a="http://schemas.openxmlformats.org/drawingml/2006/main" xmlns:r="http://schemas.openxmlformats.org/officeDocument/2006/relationships" xmlns:p="http://schemas.openxmlformats.org/presentationml/2006/main">
   <p:cSld>
     <p:spTree>
@@ -6050,7 +7052,95 @@
 </p:sld>
 </file>
 
-<file path=ppt/slides/slide33.xml><?xml version="1.0" encoding="utf-8"?>
+<file path=ppt/slides/slide4.xml><?xml version="1.0" encoding="utf-8"?>
+<p:sld xmlns:a="http://schemas.openxmlformats.org/drawingml/2006/main" xmlns:r="http://schemas.openxmlformats.org/officeDocument/2006/relationships" xmlns:p="http://schemas.openxmlformats.org/presentationml/2006/main">
+  <p:cSld>
+    <p:spTree>
+      <p:nvGrpSpPr>
+        <p:cNvPr id="1" name=""/>
+        <p:cNvGrpSpPr/>
+        <p:nvPr/>
+      </p:nvGrpSpPr>
+      <p:grpSpPr>
+        <a:xfrm>
+          <a:off x="0" y="0"/>
+          <a:ext cx="0" cy="0"/>
+          <a:chOff x="0" y="0"/>
+          <a:chExt cx="0" cy="0"/>
+        </a:xfrm>
+      </p:grpSpPr>
+      <p:sp>
+        <p:nvSpPr>
+          <p:cNvPr id="2" name="Title 1"/>
+          <p:cNvSpPr>
+            <a:spLocks noGrp="1"/>
+          </p:cNvSpPr>
+          <p:nvPr>
+            <p:ph type="title"/>
+          </p:nvPr>
+        </p:nvSpPr>
+        <p:spPr/>
+        <p:txBody>
+          <a:bodyPr/>
+          <a:lstStyle/>
+          <a:p>
+            <a:r>
+              <a:rPr lang="pl-PL" dirty="0" smtClean="0"/>
+              <a:t>Najprostszy singleton</a:t>
+            </a:r>
+            <a:endParaRPr lang="en-GB" dirty="0"/>
+          </a:p>
+        </p:txBody>
+      </p:sp>
+      <p:sp>
+        <p:nvSpPr>
+          <p:cNvPr id="3" name="Content Placeholder 2"/>
+          <p:cNvSpPr>
+            <a:spLocks noGrp="1"/>
+          </p:cNvSpPr>
+          <p:nvPr>
+            <p:ph idx="1"/>
+          </p:nvPr>
+        </p:nvSpPr>
+        <p:spPr/>
+        <p:txBody>
+          <a:bodyPr/>
+          <a:lstStyle/>
+          <a:p>
+            <a:r>
+              <a:rPr lang="pl-PL" dirty="0" smtClean="0"/>
+              <a:t>Właściwość private static zawierająca jedyną instancję</a:t>
+            </a:r>
+          </a:p>
+          <a:p>
+            <a:r>
+              <a:rPr lang="pl-PL" dirty="0" smtClean="0"/>
+              <a:t>Metoda public static np. Create lub GetInstance, która zwraca lub tworzy jedyną instancję</a:t>
+            </a:r>
+          </a:p>
+          <a:p>
+            <a:r>
+              <a:rPr lang="pl-PL" dirty="0" smtClean="0"/>
+              <a:t>Prywatny konstruktor – pozwala na utworzenie lub dostęp do obiektu jedynie poprzez jedyną metodę GetInstance</a:t>
+            </a:r>
+            <a:endParaRPr lang="en-GB" dirty="0"/>
+          </a:p>
+        </p:txBody>
+      </p:sp>
+    </p:spTree>
+    <p:extLst>
+      <p:ext uri="{BB962C8B-B14F-4D97-AF65-F5344CB8AC3E}">
+        <p14:creationId xmlns:p14="http://schemas.microsoft.com/office/powerpoint/2010/main" val="3579290068"/>
+      </p:ext>
+    </p:extLst>
+  </p:cSld>
+  <p:clrMapOvr>
+    <a:masterClrMapping/>
+  </p:clrMapOvr>
+</p:sld>
+</file>
+
+<file path=ppt/slides/slide40.xml><?xml version="1.0" encoding="utf-8"?>
 <p:sld xmlns:a="http://schemas.openxmlformats.org/drawingml/2006/main" xmlns:r="http://schemas.openxmlformats.org/officeDocument/2006/relationships" xmlns:p="http://schemas.openxmlformats.org/presentationml/2006/main">
   <p:cSld>
     <p:spTree>
@@ -6207,843 +7297,6 @@
 </p:sld>
 </file>
 
-<file path=ppt/slides/slide34.xml><?xml version="1.0" encoding="utf-8"?>
-<p:sld xmlns:a="http://schemas.openxmlformats.org/drawingml/2006/main" xmlns:r="http://schemas.openxmlformats.org/officeDocument/2006/relationships" xmlns:p="http://schemas.openxmlformats.org/presentationml/2006/main">
-  <p:cSld>
-    <p:spTree>
-      <p:nvGrpSpPr>
-        <p:cNvPr id="1" name=""/>
-        <p:cNvGrpSpPr/>
-        <p:nvPr/>
-      </p:nvGrpSpPr>
-      <p:grpSpPr>
-        <a:xfrm>
-          <a:off x="0" y="0"/>
-          <a:ext cx="0" cy="0"/>
-          <a:chOff x="0" y="0"/>
-          <a:chExt cx="0" cy="0"/>
-        </a:xfrm>
-      </p:grpSpPr>
-      <p:sp>
-        <p:nvSpPr>
-          <p:cNvPr id="2" name="Title 1"/>
-          <p:cNvSpPr>
-            <a:spLocks noGrp="1"/>
-          </p:cNvSpPr>
-          <p:nvPr>
-            <p:ph type="title"/>
-          </p:nvPr>
-        </p:nvSpPr>
-        <p:spPr/>
-        <p:txBody>
-          <a:bodyPr/>
-          <a:lstStyle/>
-          <a:p>
-            <a:r>
-              <a:rPr lang="pl-PL" dirty="0" smtClean="0"/>
-              <a:t>Local variables</a:t>
-            </a:r>
-            <a:endParaRPr lang="en-GB" dirty="0"/>
-          </a:p>
-        </p:txBody>
-      </p:sp>
-      <p:sp>
-        <p:nvSpPr>
-          <p:cNvPr id="3" name="Content Placeholder 2"/>
-          <p:cNvSpPr>
-            <a:spLocks noGrp="1"/>
-          </p:cNvSpPr>
-          <p:nvPr>
-            <p:ph idx="1"/>
-          </p:nvPr>
-        </p:nvSpPr>
-        <p:spPr/>
-        <p:txBody>
-          <a:bodyPr/>
-          <a:lstStyle/>
-          <a:p>
-            <a:r>
-              <a:rPr lang="en-US" dirty="0"/>
-              <a:t>On its </a:t>
-            </a:r>
-            <a:r>
-              <a:rPr lang="en-US" dirty="0" smtClean="0"/>
-              <a:t>stack</a:t>
-            </a:r>
-            <a:r>
-              <a:rPr lang="pl-PL" dirty="0" smtClean="0"/>
-              <a:t> </a:t>
-            </a:r>
-            <a:r>
-              <a:rPr lang="en-US" dirty="0" smtClean="0"/>
-              <a:t>(</a:t>
-            </a:r>
-            <a:r>
-              <a:rPr lang="en-US" dirty="0"/>
-              <a:t>basically thread stack), local primitives and local reference variables are stored. </a:t>
-            </a:r>
-            <a:endParaRPr lang="pl-PL" dirty="0" smtClean="0"/>
-          </a:p>
-          <a:p>
-            <a:r>
-              <a:rPr lang="en-US" dirty="0" smtClean="0"/>
-              <a:t>Hence </a:t>
-            </a:r>
-            <a:r>
-              <a:rPr lang="en-US" dirty="0"/>
-              <a:t>one thread does not share its local variables with any other thread as these local variables and references are inside the thread's private stack. Hence local variables are always thread-safe.</a:t>
-            </a:r>
-            <a:endParaRPr lang="en-GB" dirty="0"/>
-          </a:p>
-        </p:txBody>
-      </p:sp>
-    </p:spTree>
-    <p:extLst>
-      <p:ext uri="{BB962C8B-B14F-4D97-AF65-F5344CB8AC3E}">
-        <p14:creationId xmlns:p14="http://schemas.microsoft.com/office/powerpoint/2010/main" val="512667403"/>
-      </p:ext>
-    </p:extLst>
-  </p:cSld>
-  <p:clrMapOvr>
-    <a:masterClrMapping/>
-  </p:clrMapOvr>
-</p:sld>
-</file>
-
-<file path=ppt/slides/slide35.xml><?xml version="1.0" encoding="utf-8"?>
-<p:sld xmlns:a="http://schemas.openxmlformats.org/drawingml/2006/main" xmlns:r="http://schemas.openxmlformats.org/officeDocument/2006/relationships" xmlns:p="http://schemas.openxmlformats.org/presentationml/2006/main">
-  <p:cSld>
-    <p:spTree>
-      <p:nvGrpSpPr>
-        <p:cNvPr id="1" name=""/>
-        <p:cNvGrpSpPr/>
-        <p:nvPr/>
-      </p:nvGrpSpPr>
-      <p:grpSpPr>
-        <a:xfrm>
-          <a:off x="0" y="0"/>
-          <a:ext cx="0" cy="0"/>
-          <a:chOff x="0" y="0"/>
-          <a:chExt cx="0" cy="0"/>
-        </a:xfrm>
-      </p:grpSpPr>
-      <p:sp>
-        <p:nvSpPr>
-          <p:cNvPr id="2" name="Title 1"/>
-          <p:cNvSpPr>
-            <a:spLocks noGrp="1"/>
-          </p:cNvSpPr>
-          <p:nvPr>
-            <p:ph type="title"/>
-          </p:nvPr>
-        </p:nvSpPr>
-        <p:spPr/>
-        <p:txBody>
-          <a:bodyPr/>
-          <a:lstStyle/>
-          <a:p>
-            <a:r>
-              <a:rPr lang="pl-PL" dirty="0" smtClean="0"/>
-              <a:t>Singleton &amp; SOLID - </a:t>
-            </a:r>
-            <a:r>
-              <a:rPr lang="pl-PL" b="1" dirty="0" smtClean="0"/>
-              <a:t>S</a:t>
-            </a:r>
-            <a:endParaRPr lang="en-GB" b="1" dirty="0"/>
-          </a:p>
-        </p:txBody>
-      </p:sp>
-      <p:sp>
-        <p:nvSpPr>
-          <p:cNvPr id="3" name="Content Placeholder 2"/>
-          <p:cNvSpPr>
-            <a:spLocks noGrp="1"/>
-          </p:cNvSpPr>
-          <p:nvPr>
-            <p:ph idx="1"/>
-          </p:nvPr>
-        </p:nvSpPr>
-        <p:spPr/>
-        <p:txBody>
-          <a:bodyPr/>
-          <a:lstStyle/>
-          <a:p>
-            <a:pPr marL="0" indent="0">
-              <a:buNone/>
-            </a:pPr>
-            <a:r>
-              <a:rPr lang="pl-PL" dirty="0" smtClean="0"/>
-              <a:t>Singleton pogwałca zasadę </a:t>
-            </a:r>
-            <a:r>
-              <a:rPr lang="pl-PL" b="1" dirty="0" smtClean="0"/>
-              <a:t>S,</a:t>
-            </a:r>
-            <a:r>
-              <a:rPr lang="pl-PL" dirty="0" smtClean="0"/>
-              <a:t> ponieważ:</a:t>
-            </a:r>
-            <a:endParaRPr lang="pl-PL" dirty="0"/>
-          </a:p>
-          <a:p>
-            <a:pPr marL="0" indent="0">
-              <a:buNone/>
-            </a:pPr>
-            <a:r>
-              <a:rPr lang="pl-PL" dirty="0"/>
-              <a:t> - </a:t>
-            </a:r>
-            <a:r>
-              <a:rPr lang="pl-PL" dirty="0" smtClean="0"/>
-              <a:t>Jest klasą, która ma swoją własną funkcjonalność (np. rozwiązanie problemu biznesowego)</a:t>
-            </a:r>
-            <a:endParaRPr lang="pl-PL" dirty="0"/>
-          </a:p>
-          <a:p>
-            <a:pPr marL="0" indent="0">
-              <a:buNone/>
-            </a:pPr>
-            <a:r>
-              <a:rPr lang="pl-PL" dirty="0"/>
-              <a:t> - </a:t>
-            </a:r>
-            <a:r>
-              <a:rPr lang="pl-PL" dirty="0" smtClean="0"/>
-              <a:t>Jest odpowiedzialna za tworzenie siebie samej i zarządzanie swoim cyklem życia</a:t>
-            </a:r>
-            <a:endParaRPr lang="pl-PL" dirty="0"/>
-          </a:p>
-          <a:p>
-            <a:pPr lvl="1"/>
-            <a:endParaRPr lang="en-GB" dirty="0"/>
-          </a:p>
-        </p:txBody>
-      </p:sp>
-    </p:spTree>
-    <p:extLst>
-      <p:ext uri="{BB962C8B-B14F-4D97-AF65-F5344CB8AC3E}">
-        <p14:creationId xmlns:p14="http://schemas.microsoft.com/office/powerpoint/2010/main" val="917751850"/>
-      </p:ext>
-    </p:extLst>
-  </p:cSld>
-  <p:clrMapOvr>
-    <a:masterClrMapping/>
-  </p:clrMapOvr>
-</p:sld>
-</file>
-
-<file path=ppt/slides/slide36.xml><?xml version="1.0" encoding="utf-8"?>
-<p:sld xmlns:a="http://schemas.openxmlformats.org/drawingml/2006/main" xmlns:r="http://schemas.openxmlformats.org/officeDocument/2006/relationships" xmlns:p="http://schemas.openxmlformats.org/presentationml/2006/main">
-  <p:cSld>
-    <p:spTree>
-      <p:nvGrpSpPr>
-        <p:cNvPr id="1" name=""/>
-        <p:cNvGrpSpPr/>
-        <p:nvPr/>
-      </p:nvGrpSpPr>
-      <p:grpSpPr>
-        <a:xfrm>
-          <a:off x="0" y="0"/>
-          <a:ext cx="0" cy="0"/>
-          <a:chOff x="0" y="0"/>
-          <a:chExt cx="0" cy="0"/>
-        </a:xfrm>
-      </p:grpSpPr>
-      <p:sp>
-        <p:nvSpPr>
-          <p:cNvPr id="2" name="Title 1"/>
-          <p:cNvSpPr>
-            <a:spLocks noGrp="1"/>
-          </p:cNvSpPr>
-          <p:nvPr>
-            <p:ph type="title"/>
-          </p:nvPr>
-        </p:nvSpPr>
-        <p:spPr/>
-        <p:txBody>
-          <a:bodyPr/>
-          <a:lstStyle/>
-          <a:p>
-            <a:r>
-              <a:rPr lang="pl-PL" dirty="0"/>
-              <a:t>Singleton &amp; SOLID - </a:t>
-            </a:r>
-            <a:r>
-              <a:rPr lang="pl-PL" b="1" dirty="0" smtClean="0"/>
-              <a:t>O</a:t>
-            </a:r>
-            <a:endParaRPr lang="en-GB" dirty="0"/>
-          </a:p>
-        </p:txBody>
-      </p:sp>
-      <p:sp>
-        <p:nvSpPr>
-          <p:cNvPr id="3" name="Content Placeholder 2"/>
-          <p:cNvSpPr>
-            <a:spLocks noGrp="1"/>
-          </p:cNvSpPr>
-          <p:nvPr>
-            <p:ph idx="1"/>
-          </p:nvPr>
-        </p:nvSpPr>
-        <p:spPr/>
-        <p:txBody>
-          <a:bodyPr/>
-          <a:lstStyle/>
-          <a:p>
-            <a:r>
-              <a:rPr lang="pl-PL" dirty="0"/>
-              <a:t>Singleton pogwałca zasadę </a:t>
-            </a:r>
-            <a:r>
-              <a:rPr lang="pl-PL" b="1" dirty="0" smtClean="0"/>
-              <a:t>O,</a:t>
-            </a:r>
-            <a:r>
-              <a:rPr lang="pl-PL" dirty="0" smtClean="0"/>
-              <a:t> </a:t>
-            </a:r>
-            <a:r>
-              <a:rPr lang="pl-PL" dirty="0"/>
-              <a:t>ponieważ:</a:t>
-            </a:r>
-          </a:p>
-          <a:p>
-            <a:pPr lvl="1"/>
-            <a:r>
-              <a:rPr lang="pl-PL" dirty="0" smtClean="0"/>
-              <a:t>Posługuje się jedyną statyczną instancją, co uniemożliwia rozszerzalność</a:t>
-            </a:r>
-          </a:p>
-          <a:p>
-            <a:pPr lvl="1"/>
-            <a:r>
-              <a:rPr lang="pl-PL" dirty="0" smtClean="0"/>
-              <a:t>Jeżeli klasa ma zostać zaktualizowana, musi ona zostać poddana modyfikacji</a:t>
-            </a:r>
-          </a:p>
-          <a:p>
-            <a:pPr lvl="1"/>
-            <a:r>
-              <a:rPr lang="pl-PL" dirty="0" smtClean="0"/>
-              <a:t>Nie można jej rozszerzyć bez zmiany kodu</a:t>
-            </a:r>
-            <a:endParaRPr lang="en-GB" dirty="0"/>
-          </a:p>
-        </p:txBody>
-      </p:sp>
-    </p:spTree>
-    <p:extLst>
-      <p:ext uri="{BB962C8B-B14F-4D97-AF65-F5344CB8AC3E}">
-        <p14:creationId xmlns:p14="http://schemas.microsoft.com/office/powerpoint/2010/main" val="270253028"/>
-      </p:ext>
-    </p:extLst>
-  </p:cSld>
-  <p:clrMapOvr>
-    <a:masterClrMapping/>
-  </p:clrMapOvr>
-</p:sld>
-</file>
-
-<file path=ppt/slides/slide37.xml><?xml version="1.0" encoding="utf-8"?>
-<p:sld xmlns:a="http://schemas.openxmlformats.org/drawingml/2006/main" xmlns:r="http://schemas.openxmlformats.org/officeDocument/2006/relationships" xmlns:p="http://schemas.openxmlformats.org/presentationml/2006/main">
-  <p:cSld>
-    <p:spTree>
-      <p:nvGrpSpPr>
-        <p:cNvPr id="1" name=""/>
-        <p:cNvGrpSpPr/>
-        <p:nvPr/>
-      </p:nvGrpSpPr>
-      <p:grpSpPr>
-        <a:xfrm>
-          <a:off x="0" y="0"/>
-          <a:ext cx="0" cy="0"/>
-          <a:chOff x="0" y="0"/>
-          <a:chExt cx="0" cy="0"/>
-        </a:xfrm>
-      </p:grpSpPr>
-      <p:sp>
-        <p:nvSpPr>
-          <p:cNvPr id="2" name="Title 1"/>
-          <p:cNvSpPr>
-            <a:spLocks noGrp="1"/>
-          </p:cNvSpPr>
-          <p:nvPr>
-            <p:ph type="title"/>
-          </p:nvPr>
-        </p:nvSpPr>
-        <p:spPr/>
-        <p:txBody>
-          <a:bodyPr/>
-          <a:lstStyle/>
-          <a:p>
-            <a:r>
-              <a:rPr lang="pl-PL" dirty="0"/>
-              <a:t>Singleton &amp; SOLID - </a:t>
-            </a:r>
-            <a:r>
-              <a:rPr lang="pl-PL" b="1" dirty="0"/>
-              <a:t>L</a:t>
-            </a:r>
-            <a:endParaRPr lang="en-GB" dirty="0"/>
-          </a:p>
-        </p:txBody>
-      </p:sp>
-      <p:sp>
-        <p:nvSpPr>
-          <p:cNvPr id="3" name="Content Placeholder 2"/>
-          <p:cNvSpPr>
-            <a:spLocks noGrp="1"/>
-          </p:cNvSpPr>
-          <p:nvPr>
-            <p:ph idx="1"/>
-          </p:nvPr>
-        </p:nvSpPr>
-        <p:spPr/>
-        <p:txBody>
-          <a:bodyPr/>
-          <a:lstStyle/>
-          <a:p>
-            <a:r>
-              <a:rPr lang="pl-PL" dirty="0"/>
-              <a:t>Singleton </a:t>
-            </a:r>
-            <a:r>
-              <a:rPr lang="pl-PL" dirty="0" smtClean="0"/>
-              <a:t>nie pogwałca zasady </a:t>
-            </a:r>
-            <a:r>
-              <a:rPr lang="pl-PL" b="1" dirty="0"/>
-              <a:t>L</a:t>
-            </a:r>
-            <a:r>
-              <a:rPr lang="pl-PL" b="1" dirty="0" smtClean="0"/>
-              <a:t>,</a:t>
-            </a:r>
-            <a:r>
-              <a:rPr lang="pl-PL" dirty="0" smtClean="0"/>
-              <a:t> </a:t>
-            </a:r>
-            <a:r>
-              <a:rPr lang="pl-PL" dirty="0"/>
-              <a:t>ponieważ:</a:t>
-            </a:r>
-          </a:p>
-          <a:p>
-            <a:pPr lvl="1"/>
-            <a:r>
-              <a:rPr lang="pl-PL" dirty="0" smtClean="0"/>
-              <a:t>Nie jest zaangażowany dziedzieczenie w sposób bezpośredni</a:t>
-            </a:r>
-          </a:p>
-          <a:p>
-            <a:pPr lvl="1"/>
-            <a:r>
-              <a:rPr lang="pl-PL" dirty="0" smtClean="0"/>
-              <a:t>Plus tego wzorca</a:t>
-            </a:r>
-            <a:endParaRPr lang="en-GB" dirty="0"/>
-          </a:p>
-        </p:txBody>
-      </p:sp>
-    </p:spTree>
-    <p:extLst>
-      <p:ext uri="{BB962C8B-B14F-4D97-AF65-F5344CB8AC3E}">
-        <p14:creationId xmlns:p14="http://schemas.microsoft.com/office/powerpoint/2010/main" val="373308208"/>
-      </p:ext>
-    </p:extLst>
-  </p:cSld>
-  <p:clrMapOvr>
-    <a:masterClrMapping/>
-  </p:clrMapOvr>
-</p:sld>
-</file>
-
-<file path=ppt/slides/slide38.xml><?xml version="1.0" encoding="utf-8"?>
-<p:sld xmlns:a="http://schemas.openxmlformats.org/drawingml/2006/main" xmlns:r="http://schemas.openxmlformats.org/officeDocument/2006/relationships" xmlns:p="http://schemas.openxmlformats.org/presentationml/2006/main">
-  <p:cSld>
-    <p:spTree>
-      <p:nvGrpSpPr>
-        <p:cNvPr id="1" name=""/>
-        <p:cNvGrpSpPr/>
-        <p:nvPr/>
-      </p:nvGrpSpPr>
-      <p:grpSpPr>
-        <a:xfrm>
-          <a:off x="0" y="0"/>
-          <a:ext cx="0" cy="0"/>
-          <a:chOff x="0" y="0"/>
-          <a:chExt cx="0" cy="0"/>
-        </a:xfrm>
-      </p:grpSpPr>
-      <p:sp>
-        <p:nvSpPr>
-          <p:cNvPr id="2" name="Title 1"/>
-          <p:cNvSpPr>
-            <a:spLocks noGrp="1"/>
-          </p:cNvSpPr>
-          <p:nvPr>
-            <p:ph type="title"/>
-          </p:nvPr>
-        </p:nvSpPr>
-        <p:spPr/>
-        <p:txBody>
-          <a:bodyPr/>
-          <a:lstStyle/>
-          <a:p>
-            <a:r>
-              <a:rPr lang="pl-PL" dirty="0"/>
-              <a:t>Singleton &amp; SOLID - </a:t>
-            </a:r>
-            <a:r>
-              <a:rPr lang="pl-PL" b="1" dirty="0" smtClean="0"/>
-              <a:t>I</a:t>
-            </a:r>
-            <a:endParaRPr lang="en-GB" dirty="0"/>
-          </a:p>
-        </p:txBody>
-      </p:sp>
-      <p:sp>
-        <p:nvSpPr>
-          <p:cNvPr id="3" name="Content Placeholder 2"/>
-          <p:cNvSpPr>
-            <a:spLocks noGrp="1"/>
-          </p:cNvSpPr>
-          <p:nvPr>
-            <p:ph idx="1"/>
-          </p:nvPr>
-        </p:nvSpPr>
-        <p:spPr/>
-        <p:txBody>
-          <a:bodyPr/>
-          <a:lstStyle/>
-          <a:p>
-            <a:r>
-              <a:rPr lang="pl-PL" dirty="0"/>
-              <a:t>Singleton pogwałca zasadę </a:t>
-            </a:r>
-            <a:r>
-              <a:rPr lang="pl-PL" b="1" dirty="0" smtClean="0"/>
-              <a:t>I,</a:t>
-            </a:r>
-            <a:r>
-              <a:rPr lang="pl-PL" dirty="0" smtClean="0"/>
-              <a:t> </a:t>
-            </a:r>
-            <a:r>
-              <a:rPr lang="pl-PL" dirty="0"/>
-              <a:t>ponieważ:</a:t>
-            </a:r>
-          </a:p>
-          <a:p>
-            <a:pPr lvl="1"/>
-            <a:r>
-              <a:rPr lang="pl-PL" dirty="0" smtClean="0"/>
-              <a:t>Nie jest zaangażowany żaden interfejs</a:t>
-            </a:r>
-            <a:endParaRPr lang="en-GB" dirty="0"/>
-          </a:p>
-        </p:txBody>
-      </p:sp>
-    </p:spTree>
-    <p:extLst>
-      <p:ext uri="{BB962C8B-B14F-4D97-AF65-F5344CB8AC3E}">
-        <p14:creationId xmlns:p14="http://schemas.microsoft.com/office/powerpoint/2010/main" val="1270374757"/>
-      </p:ext>
-    </p:extLst>
-  </p:cSld>
-  <p:clrMapOvr>
-    <a:masterClrMapping/>
-  </p:clrMapOvr>
-</p:sld>
-</file>
-
-<file path=ppt/slides/slide39.xml><?xml version="1.0" encoding="utf-8"?>
-<p:sld xmlns:a="http://schemas.openxmlformats.org/drawingml/2006/main" xmlns:r="http://schemas.openxmlformats.org/officeDocument/2006/relationships" xmlns:p="http://schemas.openxmlformats.org/presentationml/2006/main">
-  <p:cSld>
-    <p:spTree>
-      <p:nvGrpSpPr>
-        <p:cNvPr id="1" name=""/>
-        <p:cNvGrpSpPr/>
-        <p:nvPr/>
-      </p:nvGrpSpPr>
-      <p:grpSpPr>
-        <a:xfrm>
-          <a:off x="0" y="0"/>
-          <a:ext cx="0" cy="0"/>
-          <a:chOff x="0" y="0"/>
-          <a:chExt cx="0" cy="0"/>
-        </a:xfrm>
-      </p:grpSpPr>
-      <p:sp>
-        <p:nvSpPr>
-          <p:cNvPr id="2" name="Title 1"/>
-          <p:cNvSpPr>
-            <a:spLocks noGrp="1"/>
-          </p:cNvSpPr>
-          <p:nvPr>
-            <p:ph type="title"/>
-          </p:nvPr>
-        </p:nvSpPr>
-        <p:spPr/>
-        <p:txBody>
-          <a:bodyPr/>
-          <a:lstStyle/>
-          <a:p>
-            <a:r>
-              <a:rPr lang="pl-PL" dirty="0"/>
-              <a:t>Singleton &amp; SOLID - </a:t>
-            </a:r>
-            <a:r>
-              <a:rPr lang="pl-PL" b="1" dirty="0" smtClean="0"/>
-              <a:t>D</a:t>
-            </a:r>
-            <a:endParaRPr lang="en-GB" dirty="0"/>
-          </a:p>
-        </p:txBody>
-      </p:sp>
-      <p:sp>
-        <p:nvSpPr>
-          <p:cNvPr id="3" name="Content Placeholder 2"/>
-          <p:cNvSpPr>
-            <a:spLocks noGrp="1"/>
-          </p:cNvSpPr>
-          <p:nvPr>
-            <p:ph idx="1"/>
-          </p:nvPr>
-        </p:nvSpPr>
-        <p:spPr/>
-        <p:txBody>
-          <a:bodyPr/>
-          <a:lstStyle/>
-          <a:p>
-            <a:r>
-              <a:rPr lang="pl-PL" dirty="0"/>
-              <a:t>Singleton pogwałca zasadę </a:t>
-            </a:r>
-            <a:r>
-              <a:rPr lang="pl-PL" b="1" dirty="0"/>
-              <a:t>D</a:t>
-            </a:r>
-            <a:r>
-              <a:rPr lang="pl-PL" b="1" dirty="0" smtClean="0"/>
-              <a:t>,</a:t>
-            </a:r>
-            <a:r>
-              <a:rPr lang="pl-PL" dirty="0" smtClean="0"/>
-              <a:t> </a:t>
-            </a:r>
-            <a:r>
-              <a:rPr lang="pl-PL" dirty="0"/>
-              <a:t>ponieważ:</a:t>
-            </a:r>
-          </a:p>
-          <a:p>
-            <a:pPr lvl="1"/>
-            <a:r>
-              <a:rPr lang="pl-PL" dirty="0" smtClean="0"/>
-              <a:t>Ma silne sprzężenie zwrotne do samego siebie</a:t>
-            </a:r>
-          </a:p>
-          <a:p>
-            <a:pPr lvl="1"/>
-            <a:r>
-              <a:rPr lang="pl-PL" dirty="0" smtClean="0"/>
-              <a:t>Narzuca używanie statycznej instancji poprzez metodę lub właściwość w sposób bezpośredni, bez używania żadnej abstrakcji</a:t>
-            </a:r>
-          </a:p>
-        </p:txBody>
-      </p:sp>
-    </p:spTree>
-    <p:extLst>
-      <p:ext uri="{BB962C8B-B14F-4D97-AF65-F5344CB8AC3E}">
-        <p14:creationId xmlns:p14="http://schemas.microsoft.com/office/powerpoint/2010/main" val="347777837"/>
-      </p:ext>
-    </p:extLst>
-  </p:cSld>
-  <p:clrMapOvr>
-    <a:masterClrMapping/>
-  </p:clrMapOvr>
-</p:sld>
-</file>
-
-<file path=ppt/slides/slide4.xml><?xml version="1.0" encoding="utf-8"?>
-<p:sld xmlns:a="http://schemas.openxmlformats.org/drawingml/2006/main" xmlns:r="http://schemas.openxmlformats.org/officeDocument/2006/relationships" xmlns:p="http://schemas.openxmlformats.org/presentationml/2006/main">
-  <p:cSld>
-    <p:spTree>
-      <p:nvGrpSpPr>
-        <p:cNvPr id="1" name=""/>
-        <p:cNvGrpSpPr/>
-        <p:nvPr/>
-      </p:nvGrpSpPr>
-      <p:grpSpPr>
-        <a:xfrm>
-          <a:off x="0" y="0"/>
-          <a:ext cx="0" cy="0"/>
-          <a:chOff x="0" y="0"/>
-          <a:chExt cx="0" cy="0"/>
-        </a:xfrm>
-      </p:grpSpPr>
-      <p:sp>
-        <p:nvSpPr>
-          <p:cNvPr id="2" name="Title 1"/>
-          <p:cNvSpPr>
-            <a:spLocks noGrp="1"/>
-          </p:cNvSpPr>
-          <p:nvPr>
-            <p:ph type="title"/>
-          </p:nvPr>
-        </p:nvSpPr>
-        <p:spPr/>
-        <p:txBody>
-          <a:bodyPr/>
-          <a:lstStyle/>
-          <a:p>
-            <a:r>
-              <a:rPr lang="pl-PL" dirty="0" smtClean="0"/>
-              <a:t>Najprostszy singleton</a:t>
-            </a:r>
-            <a:endParaRPr lang="en-GB" dirty="0"/>
-          </a:p>
-        </p:txBody>
-      </p:sp>
-      <p:sp>
-        <p:nvSpPr>
-          <p:cNvPr id="3" name="Content Placeholder 2"/>
-          <p:cNvSpPr>
-            <a:spLocks noGrp="1"/>
-          </p:cNvSpPr>
-          <p:nvPr>
-            <p:ph idx="1"/>
-          </p:nvPr>
-        </p:nvSpPr>
-        <p:spPr/>
-        <p:txBody>
-          <a:bodyPr/>
-          <a:lstStyle/>
-          <a:p>
-            <a:r>
-              <a:rPr lang="pl-PL" dirty="0" smtClean="0"/>
-              <a:t>Właściwość private static zawierająca jedyną instancję</a:t>
-            </a:r>
-          </a:p>
-          <a:p>
-            <a:r>
-              <a:rPr lang="pl-PL" dirty="0" smtClean="0"/>
-              <a:t>Metoda public static np. Create lub GetInstance, która zwraca lub tworzy jedyną instancję</a:t>
-            </a:r>
-          </a:p>
-          <a:p>
-            <a:r>
-              <a:rPr lang="pl-PL" dirty="0" smtClean="0"/>
-              <a:t>Prywatny konstruktor – pozwala na utworzenie lub dostęp do obiektu jedynie poprzez jedyną metodę GetInstance</a:t>
-            </a:r>
-            <a:endParaRPr lang="en-GB" dirty="0"/>
-          </a:p>
-        </p:txBody>
-      </p:sp>
-    </p:spTree>
-    <p:extLst>
-      <p:ext uri="{BB962C8B-B14F-4D97-AF65-F5344CB8AC3E}">
-        <p14:creationId xmlns:p14="http://schemas.microsoft.com/office/powerpoint/2010/main" val="3579290068"/>
-      </p:ext>
-    </p:extLst>
-  </p:cSld>
-  <p:clrMapOvr>
-    <a:masterClrMapping/>
-  </p:clrMapOvr>
-</p:sld>
-</file>
-
-<file path=ppt/slides/slide40.xml><?xml version="1.0" encoding="utf-8"?>
-<p:sld xmlns:a="http://schemas.openxmlformats.org/drawingml/2006/main" xmlns:r="http://schemas.openxmlformats.org/officeDocument/2006/relationships" xmlns:p="http://schemas.openxmlformats.org/presentationml/2006/main">
-  <p:cSld>
-    <p:spTree>
-      <p:nvGrpSpPr>
-        <p:cNvPr id="1" name=""/>
-        <p:cNvGrpSpPr/>
-        <p:nvPr/>
-      </p:nvGrpSpPr>
-      <p:grpSpPr>
-        <a:xfrm>
-          <a:off x="0" y="0"/>
-          <a:ext cx="0" cy="0"/>
-          <a:chOff x="0" y="0"/>
-          <a:chExt cx="0" cy="0"/>
-        </a:xfrm>
-      </p:grpSpPr>
-      <p:sp>
-        <p:nvSpPr>
-          <p:cNvPr id="2" name="Title 1"/>
-          <p:cNvSpPr>
-            <a:spLocks noGrp="1"/>
-          </p:cNvSpPr>
-          <p:nvPr>
-            <p:ph type="title"/>
-          </p:nvPr>
-        </p:nvSpPr>
-        <p:spPr/>
-        <p:txBody>
-          <a:bodyPr/>
-          <a:lstStyle/>
-          <a:p>
-            <a:r>
-              <a:rPr lang="pl-PL" dirty="0" smtClean="0"/>
-              <a:t>Konkluzje I</a:t>
-            </a:r>
-            <a:endParaRPr lang="en-GB" dirty="0"/>
-          </a:p>
-        </p:txBody>
-      </p:sp>
-      <p:sp>
-        <p:nvSpPr>
-          <p:cNvPr id="3" name="Content Placeholder 2"/>
-          <p:cNvSpPr>
-            <a:spLocks noGrp="1"/>
-          </p:cNvSpPr>
-          <p:nvPr>
-            <p:ph idx="1"/>
-          </p:nvPr>
-        </p:nvSpPr>
-        <p:spPr/>
-        <p:txBody>
-          <a:bodyPr/>
-          <a:lstStyle/>
-          <a:p>
-            <a:r>
-              <a:rPr lang="pl-PL" dirty="0" smtClean="0"/>
-              <a:t>Posiadanie jednej instancji pewnej klasy jest prawidłowym i pożądanym konceptem</a:t>
-            </a:r>
-          </a:p>
-          <a:p>
-            <a:r>
-              <a:rPr lang="pl-PL" dirty="0" smtClean="0"/>
-              <a:t>Nie powinno być to jednak realizowane za pomocą wzorca Singletona</a:t>
-            </a:r>
-          </a:p>
-          <a:p>
-            <a:r>
-              <a:rPr lang="pl-PL" dirty="0" smtClean="0"/>
-              <a:t>Klasy singletonów powinny być refaktoryzowane</a:t>
-            </a:r>
-            <a:endParaRPr lang="en-GB" dirty="0"/>
-          </a:p>
-        </p:txBody>
-      </p:sp>
-    </p:spTree>
-    <p:extLst>
-      <p:ext uri="{BB962C8B-B14F-4D97-AF65-F5344CB8AC3E}">
-        <p14:creationId xmlns:p14="http://schemas.microsoft.com/office/powerpoint/2010/main" val="1497019650"/>
-      </p:ext>
-    </p:extLst>
-  </p:cSld>
-  <p:clrMapOvr>
-    <a:masterClrMapping/>
-  </p:clrMapOvr>
-</p:sld>
-</file>
-
 <file path=ppt/slides/slide41.xml><?xml version="1.0" encoding="utf-8"?>
 <p:sld xmlns:a="http://schemas.openxmlformats.org/drawingml/2006/main" xmlns:r="http://schemas.openxmlformats.org/officeDocument/2006/relationships" xmlns:p="http://schemas.openxmlformats.org/presentationml/2006/main">
   <p:cSld>
@@ -7078,7 +7331,7 @@
           <a:p>
             <a:r>
               <a:rPr lang="pl-PL" dirty="0" smtClean="0"/>
-              <a:t>Konkluzje II</a:t>
+              <a:t>Statyczne konstruktory</a:t>
             </a:r>
             <a:endParaRPr lang="en-GB" dirty="0"/>
           </a:p>
@@ -7096,38 +7349,18 @@
         </p:nvSpPr>
         <p:spPr/>
         <p:txBody>
-          <a:bodyPr>
-            <a:normAutofit fontScale="92500" lnSpcReduction="20000"/>
-          </a:bodyPr>
-          <a:lstStyle/>
-          <a:p>
-            <a:r>
-              <a:rPr lang="pl-PL" dirty="0" smtClean="0"/>
-              <a:t>Użycie statycznych elementów klasy powinno być unikane</a:t>
-            </a:r>
-          </a:p>
-          <a:p>
-            <a:r>
-              <a:rPr lang="pl-PL" dirty="0" smtClean="0"/>
-              <a:t>Tworzą one elementy globalne w systemie</a:t>
-            </a:r>
-          </a:p>
-          <a:p>
-            <a:r>
-              <a:rPr lang="pl-PL" dirty="0" smtClean="0"/>
-              <a:t>Elementy statyczne sprawiają, że system jest mniej elastyczny i bardziej „kruchy”</a:t>
-            </a:r>
-          </a:p>
-          <a:p>
-            <a:r>
-              <a:rPr lang="pl-PL" dirty="0" smtClean="0"/>
-              <a:t>Istnieją okazje, kiedy zmienna statyczne są zalecane, ale ich liczba powinna być utrzymywana na niskim poziomie</a:t>
-            </a:r>
-          </a:p>
-          <a:p>
-            <a:r>
-              <a:rPr lang="pl-PL" dirty="0" smtClean="0"/>
-              <a:t>Należy zawsze pomyśleć dwa razy zanim użyje się zmiennej statycznej</a:t>
+          <a:bodyPr/>
+          <a:lstStyle/>
+          <a:p>
+            <a:r>
+              <a:rPr lang="pl-PL" dirty="0" smtClean="0"/>
+              <a:t>Statyczne konstruktory są thread-safe.</a:t>
+            </a:r>
+          </a:p>
+          <a:p>
+            <a:r>
+              <a:rPr lang="pl-PL" dirty="0" smtClean="0"/>
+              <a:t>Są uruchamiane tylko raz na całą domenę aplikacji, zanim powstaną jakiekolwiek instancje klasy czy zastaną zainicjalizowane zmienne statyczne</a:t>
             </a:r>
             <a:endParaRPr lang="en-GB" dirty="0"/>
           </a:p>
@@ -7136,7 +7369,7 @@
     </p:spTree>
     <p:extLst>
       <p:ext uri="{BB962C8B-B14F-4D97-AF65-F5344CB8AC3E}">
-        <p14:creationId xmlns:p14="http://schemas.microsoft.com/office/powerpoint/2010/main" val="1618062032"/>
+        <p14:creationId xmlns:p14="http://schemas.microsoft.com/office/powerpoint/2010/main" val="4045469235"/>
       </p:ext>
     </p:extLst>
   </p:cSld>
@@ -7180,7 +7413,7 @@
           <a:p>
             <a:r>
               <a:rPr lang="pl-PL" dirty="0" smtClean="0"/>
-              <a:t>„Za”</a:t>
+              <a:t>Local variables</a:t>
             </a:r>
             <a:endParaRPr lang="en-GB" dirty="0"/>
           </a:p>
@@ -7202,20 +7435,35 @@
           <a:lstStyle/>
           <a:p>
             <a:r>
-              <a:rPr lang="pl-PL" dirty="0" smtClean="0"/>
-              <a:t>Współdzielone zasoby takie jak bazy danych, pliki, usługi zdalne mają zapewniony unikalny punkt dostępowy.</a:t>
-            </a:r>
-          </a:p>
-          <a:p>
-            <a:r>
-              <a:rPr lang="pl-PL" dirty="0" smtClean="0"/>
-              <a:t>Globalny stan aplikacji jest chroniony, ponieważ jest tylko jeden punkt dostępu</a:t>
-            </a:r>
-          </a:p>
-          <a:p>
-            <a:r>
-              <a:rPr lang="pl-PL" dirty="0" smtClean="0"/>
-              <a:t>Singletony są inicjalizowane tylko raz zatem są wydajne (do inicjalizacji).</a:t>
+              <a:rPr lang="en-US" dirty="0"/>
+              <a:t>On its </a:t>
+            </a:r>
+            <a:r>
+              <a:rPr lang="en-US" dirty="0" smtClean="0"/>
+              <a:t>stack</a:t>
+            </a:r>
+            <a:r>
+              <a:rPr lang="pl-PL" dirty="0" smtClean="0"/>
+              <a:t> </a:t>
+            </a:r>
+            <a:r>
+              <a:rPr lang="en-US" dirty="0" smtClean="0"/>
+              <a:t>(</a:t>
+            </a:r>
+            <a:r>
+              <a:rPr lang="en-US" dirty="0"/>
+              <a:t>basically thread stack), local primitives and local reference variables are stored. </a:t>
+            </a:r>
+            <a:endParaRPr lang="pl-PL" dirty="0" smtClean="0"/>
+          </a:p>
+          <a:p>
+            <a:r>
+              <a:rPr lang="en-US" dirty="0" smtClean="0"/>
+              <a:t>Hence </a:t>
+            </a:r>
+            <a:r>
+              <a:rPr lang="en-US" dirty="0"/>
+              <a:t>one thread does not share its local variables with any other thread as these local variables and references are inside the thread's private stack. Hence local variables are always thread-safe.</a:t>
             </a:r>
             <a:endParaRPr lang="en-GB" dirty="0"/>
           </a:p>
@@ -7224,7 +7472,7 @@
     </p:spTree>
     <p:extLst>
       <p:ext uri="{BB962C8B-B14F-4D97-AF65-F5344CB8AC3E}">
-        <p14:creationId xmlns:p14="http://schemas.microsoft.com/office/powerpoint/2010/main" val="1881269533"/>
+        <p14:creationId xmlns:p14="http://schemas.microsoft.com/office/powerpoint/2010/main" val="512667403"/>
       </p:ext>
     </p:extLst>
   </p:cSld>
@@ -7268,9 +7516,13 @@
           <a:p>
             <a:r>
               <a:rPr lang="pl-PL" dirty="0" smtClean="0"/>
-              <a:t>„Przeciw”</a:t>
-            </a:r>
-            <a:endParaRPr lang="en-GB" dirty="0"/>
+              <a:t>Singleton &amp; SOLID - </a:t>
+            </a:r>
+            <a:r>
+              <a:rPr lang="pl-PL" b="1" dirty="0" smtClean="0"/>
+              <a:t>S</a:t>
+            </a:r>
+            <a:endParaRPr lang="en-GB" b="1" dirty="0"/>
           </a:p>
         </p:txBody>
       </p:sp>
@@ -7289,22 +7541,53 @@
           <a:bodyPr/>
           <a:lstStyle/>
           <a:p>
-            <a:r>
-              <a:rPr lang="pl-PL" dirty="0" smtClean="0"/>
-              <a:t>Każda klasa powinna mieć tylko jedną odpowiedzialność</a:t>
-            </a:r>
-          </a:p>
-          <a:p>
-            <a:r>
-              <a:rPr lang="pl-PL" dirty="0" smtClean="0"/>
-              <a:t>Singleton ma zapach zmiennej globalnej, ale nią nie jest, jest całą globalną klasą, która może być modyfikowana z dowolnego punktu programu</a:t>
-            </a:r>
-          </a:p>
-          <a:p>
-            <a:r>
-              <a:rPr lang="pl-PL" dirty="0" smtClean="0"/>
-              <a:t>To prowadzi do niestabilnego oprogramowania</a:t>
-            </a:r>
+            <a:pPr marL="0" indent="0">
+              <a:buNone/>
+            </a:pPr>
+            <a:r>
+              <a:rPr lang="pl-PL" dirty="0" smtClean="0"/>
+              <a:t>Singleton pogwałca zasadę </a:t>
+            </a:r>
+            <a:r>
+              <a:rPr lang="pl-PL" b="1" dirty="0" smtClean="0"/>
+              <a:t>S,</a:t>
+            </a:r>
+            <a:r>
+              <a:rPr lang="pl-PL" dirty="0" smtClean="0"/>
+              <a:t> ponieważ:</a:t>
+            </a:r>
+            <a:endParaRPr lang="pl-PL" dirty="0"/>
+          </a:p>
+          <a:p>
+            <a:pPr marL="0" indent="0">
+              <a:buNone/>
+            </a:pPr>
+            <a:r>
+              <a:rPr lang="pl-PL" dirty="0"/>
+              <a:t> - </a:t>
+            </a:r>
+            <a:r>
+              <a:rPr lang="pl-PL" dirty="0" smtClean="0"/>
+              <a:t>Jest klasą, która ma swoją własną funkcjonalność (np. rozwiązanie problemu biznesowego)</a:t>
+            </a:r>
+            <a:endParaRPr lang="pl-PL" dirty="0"/>
+          </a:p>
+          <a:p>
+            <a:pPr marL="0" indent="0">
+              <a:buNone/>
+            </a:pPr>
+            <a:r>
+              <a:rPr lang="pl-PL" dirty="0"/>
+              <a:t> - </a:t>
+            </a:r>
+            <a:r>
+              <a:rPr lang="pl-PL" dirty="0" smtClean="0"/>
+              <a:t>Jest odpowiedzialna za tworzenie siebie samej i zarządzanie swoim cyklem życia</a:t>
+            </a:r>
+            <a:endParaRPr lang="pl-PL" dirty="0"/>
+          </a:p>
+          <a:p>
+            <a:pPr lvl="1"/>
             <a:endParaRPr lang="en-GB" dirty="0"/>
           </a:p>
         </p:txBody>
@@ -7312,7 +7595,7 @@
     </p:spTree>
     <p:extLst>
       <p:ext uri="{BB962C8B-B14F-4D97-AF65-F5344CB8AC3E}">
-        <p14:creationId xmlns:p14="http://schemas.microsoft.com/office/powerpoint/2010/main" val="51350870"/>
+        <p14:creationId xmlns:p14="http://schemas.microsoft.com/office/powerpoint/2010/main" val="917751850"/>
       </p:ext>
     </p:extLst>
   </p:cSld>
@@ -7356,7 +7639,11 @@
           <a:p>
             <a:r>
               <a:rPr lang="pl-PL" dirty="0"/>
-              <a:t>„Przeciw”</a:t>
+              <a:t>Singleton &amp; SOLID - </a:t>
+            </a:r>
+            <a:r>
+              <a:rPr lang="pl-PL" b="1" dirty="0" smtClean="0"/>
+              <a:t>O</a:t>
             </a:r>
             <a:endParaRPr lang="en-GB" dirty="0"/>
           </a:p>
@@ -7374,26 +7661,45 @@
         </p:nvSpPr>
         <p:spPr/>
         <p:txBody>
-          <a:bodyPr>
-            <a:normAutofit lnSpcReduction="10000"/>
-          </a:bodyPr>
-          <a:lstStyle/>
-          <a:p>
-            <a:r>
-              <a:rPr lang="pl-PL" dirty="0" smtClean="0"/>
-              <a:t>Singleton promuje silne tight coupling pomiędzy klasami. Nie istnieje abstrakcyjny singleton.</a:t>
-            </a:r>
-          </a:p>
-          <a:p>
-            <a:r>
-              <a:rPr lang="pl-PL" dirty="0" smtClean="0"/>
-              <a:t>Nie ma możliwości testowania i mockowania klasy typu singleton. Jest ona zamknięta (sealed) i nie ma klasy rodzica, zatem nie można wykorzystać podstawienia Liskov.</a:t>
-            </a:r>
-          </a:p>
-          <a:p>
-            <a:r>
-              <a:rPr lang="pl-PL" dirty="0" smtClean="0"/>
-              <a:t>Testy jednostkowe powinny być wyizolowane – jeden test nie powinien wpływać na inny.</a:t>
+          <a:bodyPr/>
+          <a:lstStyle/>
+          <a:p>
+            <a:r>
+              <a:rPr lang="pl-PL" dirty="0"/>
+              <a:t>Singleton pogwałca zasadę </a:t>
+            </a:r>
+            <a:r>
+              <a:rPr lang="pl-PL" b="1" dirty="0" smtClean="0"/>
+              <a:t>O,</a:t>
+            </a:r>
+            <a:r>
+              <a:rPr lang="pl-PL" dirty="0" smtClean="0"/>
+              <a:t> </a:t>
+            </a:r>
+            <a:r>
+              <a:rPr lang="pl-PL" dirty="0"/>
+              <a:t>ponieważ:</a:t>
+            </a:r>
+          </a:p>
+          <a:p>
+            <a:pPr lvl="1"/>
+            <a:r>
+              <a:rPr lang="pl-PL" dirty="0" smtClean="0"/>
+              <a:t>Posługuje się jedyną statyczną instancją, co uniemożliwia rozszerzalność</a:t>
+            </a:r>
+          </a:p>
+          <a:p>
+            <a:pPr lvl="1"/>
+            <a:r>
+              <a:rPr lang="pl-PL" dirty="0" smtClean="0"/>
+              <a:t>Jeżeli klasa ma zostać zaktualizowana, musi ona zostać poddana modyfikacji</a:t>
+            </a:r>
+          </a:p>
+          <a:p>
+            <a:pPr lvl="1"/>
+            <a:r>
+              <a:rPr lang="pl-PL" dirty="0" smtClean="0"/>
+              <a:t>Nie można jej rozszerzyć bez zmiany kodu</a:t>
             </a:r>
             <a:endParaRPr lang="en-GB" dirty="0"/>
           </a:p>
@@ -7402,7 +7708,7 @@
     </p:spTree>
     <p:extLst>
       <p:ext uri="{BB962C8B-B14F-4D97-AF65-F5344CB8AC3E}">
-        <p14:creationId xmlns:p14="http://schemas.microsoft.com/office/powerpoint/2010/main" val="2566980105"/>
+        <p14:creationId xmlns:p14="http://schemas.microsoft.com/office/powerpoint/2010/main" val="270253028"/>
       </p:ext>
     </p:extLst>
   </p:cSld>
@@ -7444,7 +7750,15 @@
           <a:bodyPr/>
           <a:lstStyle/>
           <a:p>
-            <a:endParaRPr lang="en-GB"/>
+            <a:r>
+              <a:rPr lang="pl-PL" dirty="0"/>
+              <a:t>Singleton &amp; SOLID - </a:t>
+            </a:r>
+            <a:r>
+              <a:rPr lang="pl-PL" b="1" dirty="0"/>
+              <a:t>L</a:t>
+            </a:r>
+            <a:endParaRPr lang="en-GB" dirty="0"/>
           </a:p>
         </p:txBody>
       </p:sp>
@@ -7463,14 +7777,450 @@
           <a:bodyPr/>
           <a:lstStyle/>
           <a:p>
-            <a:endParaRPr lang="en-GB"/>
+            <a:r>
+              <a:rPr lang="pl-PL" dirty="0"/>
+              <a:t>Singleton </a:t>
+            </a:r>
+            <a:r>
+              <a:rPr lang="pl-PL" dirty="0" smtClean="0"/>
+              <a:t>nie pogwałca zasady </a:t>
+            </a:r>
+            <a:r>
+              <a:rPr lang="pl-PL" b="1" dirty="0"/>
+              <a:t>L</a:t>
+            </a:r>
+            <a:r>
+              <a:rPr lang="pl-PL" b="1" dirty="0" smtClean="0"/>
+              <a:t>,</a:t>
+            </a:r>
+            <a:r>
+              <a:rPr lang="pl-PL" dirty="0" smtClean="0"/>
+              <a:t> </a:t>
+            </a:r>
+            <a:r>
+              <a:rPr lang="pl-PL" dirty="0"/>
+              <a:t>ponieważ:</a:t>
+            </a:r>
+          </a:p>
+          <a:p>
+            <a:pPr lvl="1"/>
+            <a:r>
+              <a:rPr lang="pl-PL" dirty="0" smtClean="0"/>
+              <a:t>Nie jest zaangażowany dziedzieczenie w sposób bezpośredni</a:t>
+            </a:r>
+          </a:p>
+          <a:p>
+            <a:pPr lvl="1"/>
+            <a:r>
+              <a:rPr lang="pl-PL" dirty="0" smtClean="0"/>
+              <a:t>Plus tego wzorca</a:t>
+            </a:r>
+            <a:endParaRPr lang="en-GB" dirty="0"/>
           </a:p>
         </p:txBody>
       </p:sp>
     </p:spTree>
     <p:extLst>
       <p:ext uri="{BB962C8B-B14F-4D97-AF65-F5344CB8AC3E}">
-        <p14:creationId xmlns:p14="http://schemas.microsoft.com/office/powerpoint/2010/main" val="3513009154"/>
+        <p14:creationId xmlns:p14="http://schemas.microsoft.com/office/powerpoint/2010/main" val="373308208"/>
+      </p:ext>
+    </p:extLst>
+  </p:cSld>
+  <p:clrMapOvr>
+    <a:masterClrMapping/>
+  </p:clrMapOvr>
+</p:sld>
+</file>
+
+<file path=ppt/slides/slide46.xml><?xml version="1.0" encoding="utf-8"?>
+<p:sld xmlns:a="http://schemas.openxmlformats.org/drawingml/2006/main" xmlns:r="http://schemas.openxmlformats.org/officeDocument/2006/relationships" xmlns:p="http://schemas.openxmlformats.org/presentationml/2006/main">
+  <p:cSld>
+    <p:spTree>
+      <p:nvGrpSpPr>
+        <p:cNvPr id="1" name=""/>
+        <p:cNvGrpSpPr/>
+        <p:nvPr/>
+      </p:nvGrpSpPr>
+      <p:grpSpPr>
+        <a:xfrm>
+          <a:off x="0" y="0"/>
+          <a:ext cx="0" cy="0"/>
+          <a:chOff x="0" y="0"/>
+          <a:chExt cx="0" cy="0"/>
+        </a:xfrm>
+      </p:grpSpPr>
+      <p:sp>
+        <p:nvSpPr>
+          <p:cNvPr id="2" name="Title 1"/>
+          <p:cNvSpPr>
+            <a:spLocks noGrp="1"/>
+          </p:cNvSpPr>
+          <p:nvPr>
+            <p:ph type="title"/>
+          </p:nvPr>
+        </p:nvSpPr>
+        <p:spPr/>
+        <p:txBody>
+          <a:bodyPr/>
+          <a:lstStyle/>
+          <a:p>
+            <a:r>
+              <a:rPr lang="pl-PL" dirty="0"/>
+              <a:t>Singleton &amp; SOLID - </a:t>
+            </a:r>
+            <a:r>
+              <a:rPr lang="pl-PL" b="1" dirty="0" smtClean="0"/>
+              <a:t>I</a:t>
+            </a:r>
+            <a:endParaRPr lang="en-GB" dirty="0"/>
+          </a:p>
+        </p:txBody>
+      </p:sp>
+      <p:sp>
+        <p:nvSpPr>
+          <p:cNvPr id="3" name="Content Placeholder 2"/>
+          <p:cNvSpPr>
+            <a:spLocks noGrp="1"/>
+          </p:cNvSpPr>
+          <p:nvPr>
+            <p:ph idx="1"/>
+          </p:nvPr>
+        </p:nvSpPr>
+        <p:spPr/>
+        <p:txBody>
+          <a:bodyPr/>
+          <a:lstStyle/>
+          <a:p>
+            <a:r>
+              <a:rPr lang="pl-PL" dirty="0"/>
+              <a:t>Singleton pogwałca zasadę </a:t>
+            </a:r>
+            <a:r>
+              <a:rPr lang="pl-PL" b="1" dirty="0" smtClean="0"/>
+              <a:t>I,</a:t>
+            </a:r>
+            <a:r>
+              <a:rPr lang="pl-PL" dirty="0" smtClean="0"/>
+              <a:t> </a:t>
+            </a:r>
+            <a:r>
+              <a:rPr lang="pl-PL" dirty="0"/>
+              <a:t>ponieważ:</a:t>
+            </a:r>
+          </a:p>
+          <a:p>
+            <a:pPr lvl="1"/>
+            <a:r>
+              <a:rPr lang="pl-PL" dirty="0" smtClean="0"/>
+              <a:t>Nie jest zaangażowany żaden interfejs</a:t>
+            </a:r>
+            <a:endParaRPr lang="en-GB" dirty="0"/>
+          </a:p>
+        </p:txBody>
+      </p:sp>
+    </p:spTree>
+    <p:extLst>
+      <p:ext uri="{BB962C8B-B14F-4D97-AF65-F5344CB8AC3E}">
+        <p14:creationId xmlns:p14="http://schemas.microsoft.com/office/powerpoint/2010/main" val="1270374757"/>
+      </p:ext>
+    </p:extLst>
+  </p:cSld>
+  <p:clrMapOvr>
+    <a:masterClrMapping/>
+  </p:clrMapOvr>
+</p:sld>
+</file>
+
+<file path=ppt/slides/slide47.xml><?xml version="1.0" encoding="utf-8"?>
+<p:sld xmlns:a="http://schemas.openxmlformats.org/drawingml/2006/main" xmlns:r="http://schemas.openxmlformats.org/officeDocument/2006/relationships" xmlns:p="http://schemas.openxmlformats.org/presentationml/2006/main">
+  <p:cSld>
+    <p:spTree>
+      <p:nvGrpSpPr>
+        <p:cNvPr id="1" name=""/>
+        <p:cNvGrpSpPr/>
+        <p:nvPr/>
+      </p:nvGrpSpPr>
+      <p:grpSpPr>
+        <a:xfrm>
+          <a:off x="0" y="0"/>
+          <a:ext cx="0" cy="0"/>
+          <a:chOff x="0" y="0"/>
+          <a:chExt cx="0" cy="0"/>
+        </a:xfrm>
+      </p:grpSpPr>
+      <p:sp>
+        <p:nvSpPr>
+          <p:cNvPr id="2" name="Title 1"/>
+          <p:cNvSpPr>
+            <a:spLocks noGrp="1"/>
+          </p:cNvSpPr>
+          <p:nvPr>
+            <p:ph type="title"/>
+          </p:nvPr>
+        </p:nvSpPr>
+        <p:spPr/>
+        <p:txBody>
+          <a:bodyPr/>
+          <a:lstStyle/>
+          <a:p>
+            <a:r>
+              <a:rPr lang="pl-PL" dirty="0"/>
+              <a:t>Singleton &amp; SOLID - </a:t>
+            </a:r>
+            <a:r>
+              <a:rPr lang="pl-PL" b="1" dirty="0" smtClean="0"/>
+              <a:t>D</a:t>
+            </a:r>
+            <a:endParaRPr lang="en-GB" dirty="0"/>
+          </a:p>
+        </p:txBody>
+      </p:sp>
+      <p:sp>
+        <p:nvSpPr>
+          <p:cNvPr id="3" name="Content Placeholder 2"/>
+          <p:cNvSpPr>
+            <a:spLocks noGrp="1"/>
+          </p:cNvSpPr>
+          <p:nvPr>
+            <p:ph idx="1"/>
+          </p:nvPr>
+        </p:nvSpPr>
+        <p:spPr/>
+        <p:txBody>
+          <a:bodyPr/>
+          <a:lstStyle/>
+          <a:p>
+            <a:r>
+              <a:rPr lang="pl-PL" dirty="0"/>
+              <a:t>Singleton pogwałca zasadę </a:t>
+            </a:r>
+            <a:r>
+              <a:rPr lang="pl-PL" b="1" dirty="0"/>
+              <a:t>D</a:t>
+            </a:r>
+            <a:r>
+              <a:rPr lang="pl-PL" b="1" dirty="0" smtClean="0"/>
+              <a:t>,</a:t>
+            </a:r>
+            <a:r>
+              <a:rPr lang="pl-PL" dirty="0" smtClean="0"/>
+              <a:t> </a:t>
+            </a:r>
+            <a:r>
+              <a:rPr lang="pl-PL" dirty="0"/>
+              <a:t>ponieważ:</a:t>
+            </a:r>
+          </a:p>
+          <a:p>
+            <a:pPr lvl="1"/>
+            <a:r>
+              <a:rPr lang="pl-PL" dirty="0" smtClean="0"/>
+              <a:t>Ma silne sprzężenie zwrotne do samego siebie</a:t>
+            </a:r>
+          </a:p>
+          <a:p>
+            <a:pPr lvl="1"/>
+            <a:r>
+              <a:rPr lang="pl-PL" dirty="0" smtClean="0"/>
+              <a:t>Narzuca używanie statycznej instancji poprzez metodę lub właściwość w sposób bezpośredni, bez używania żadnej abstrakcji</a:t>
+            </a:r>
+          </a:p>
+        </p:txBody>
+      </p:sp>
+    </p:spTree>
+    <p:extLst>
+      <p:ext uri="{BB962C8B-B14F-4D97-AF65-F5344CB8AC3E}">
+        <p14:creationId xmlns:p14="http://schemas.microsoft.com/office/powerpoint/2010/main" val="347777837"/>
+      </p:ext>
+    </p:extLst>
+  </p:cSld>
+  <p:clrMapOvr>
+    <a:masterClrMapping/>
+  </p:clrMapOvr>
+</p:sld>
+</file>
+
+<file path=ppt/slides/slide48.xml><?xml version="1.0" encoding="utf-8"?>
+<p:sld xmlns:a="http://schemas.openxmlformats.org/drawingml/2006/main" xmlns:r="http://schemas.openxmlformats.org/officeDocument/2006/relationships" xmlns:p="http://schemas.openxmlformats.org/presentationml/2006/main">
+  <p:cSld>
+    <p:spTree>
+      <p:nvGrpSpPr>
+        <p:cNvPr id="1" name=""/>
+        <p:cNvGrpSpPr/>
+        <p:nvPr/>
+      </p:nvGrpSpPr>
+      <p:grpSpPr>
+        <a:xfrm>
+          <a:off x="0" y="0"/>
+          <a:ext cx="0" cy="0"/>
+          <a:chOff x="0" y="0"/>
+          <a:chExt cx="0" cy="0"/>
+        </a:xfrm>
+      </p:grpSpPr>
+      <p:sp>
+        <p:nvSpPr>
+          <p:cNvPr id="2" name="Title 1"/>
+          <p:cNvSpPr>
+            <a:spLocks noGrp="1"/>
+          </p:cNvSpPr>
+          <p:nvPr>
+            <p:ph type="title"/>
+          </p:nvPr>
+        </p:nvSpPr>
+        <p:spPr/>
+        <p:txBody>
+          <a:bodyPr/>
+          <a:lstStyle/>
+          <a:p>
+            <a:r>
+              <a:rPr lang="pl-PL" dirty="0" smtClean="0"/>
+              <a:t>Konkluzje I</a:t>
+            </a:r>
+            <a:endParaRPr lang="en-GB" dirty="0"/>
+          </a:p>
+        </p:txBody>
+      </p:sp>
+      <p:sp>
+        <p:nvSpPr>
+          <p:cNvPr id="3" name="Content Placeholder 2"/>
+          <p:cNvSpPr>
+            <a:spLocks noGrp="1"/>
+          </p:cNvSpPr>
+          <p:nvPr>
+            <p:ph idx="1"/>
+          </p:nvPr>
+        </p:nvSpPr>
+        <p:spPr/>
+        <p:txBody>
+          <a:bodyPr/>
+          <a:lstStyle/>
+          <a:p>
+            <a:r>
+              <a:rPr lang="pl-PL" dirty="0" smtClean="0"/>
+              <a:t>Posiadanie jednej instancji pewnej klasy jest prawidłowym i pożądanym konceptem</a:t>
+            </a:r>
+          </a:p>
+          <a:p>
+            <a:r>
+              <a:rPr lang="pl-PL" dirty="0" smtClean="0"/>
+              <a:t>Nie powinno być to jednak realizowane za pomocą wzorca Singletona</a:t>
+            </a:r>
+          </a:p>
+          <a:p>
+            <a:r>
+              <a:rPr lang="pl-PL" dirty="0" smtClean="0"/>
+              <a:t>Klasy singletonów powinny być refaktoryzowane</a:t>
+            </a:r>
+            <a:endParaRPr lang="en-GB" dirty="0"/>
+          </a:p>
+        </p:txBody>
+      </p:sp>
+    </p:spTree>
+    <p:extLst>
+      <p:ext uri="{BB962C8B-B14F-4D97-AF65-F5344CB8AC3E}">
+        <p14:creationId xmlns:p14="http://schemas.microsoft.com/office/powerpoint/2010/main" val="1497019650"/>
+      </p:ext>
+    </p:extLst>
+  </p:cSld>
+  <p:clrMapOvr>
+    <a:masterClrMapping/>
+  </p:clrMapOvr>
+</p:sld>
+</file>
+
+<file path=ppt/slides/slide49.xml><?xml version="1.0" encoding="utf-8"?>
+<p:sld xmlns:a="http://schemas.openxmlformats.org/drawingml/2006/main" xmlns:r="http://schemas.openxmlformats.org/officeDocument/2006/relationships" xmlns:p="http://schemas.openxmlformats.org/presentationml/2006/main">
+  <p:cSld>
+    <p:spTree>
+      <p:nvGrpSpPr>
+        <p:cNvPr id="1" name=""/>
+        <p:cNvGrpSpPr/>
+        <p:nvPr/>
+      </p:nvGrpSpPr>
+      <p:grpSpPr>
+        <a:xfrm>
+          <a:off x="0" y="0"/>
+          <a:ext cx="0" cy="0"/>
+          <a:chOff x="0" y="0"/>
+          <a:chExt cx="0" cy="0"/>
+        </a:xfrm>
+      </p:grpSpPr>
+      <p:sp>
+        <p:nvSpPr>
+          <p:cNvPr id="2" name="Title 1"/>
+          <p:cNvSpPr>
+            <a:spLocks noGrp="1"/>
+          </p:cNvSpPr>
+          <p:nvPr>
+            <p:ph type="title"/>
+          </p:nvPr>
+        </p:nvSpPr>
+        <p:spPr/>
+        <p:txBody>
+          <a:bodyPr/>
+          <a:lstStyle/>
+          <a:p>
+            <a:r>
+              <a:rPr lang="pl-PL" dirty="0" smtClean="0"/>
+              <a:t>Konkluzje II</a:t>
+            </a:r>
+            <a:endParaRPr lang="en-GB" dirty="0"/>
+          </a:p>
+        </p:txBody>
+      </p:sp>
+      <p:sp>
+        <p:nvSpPr>
+          <p:cNvPr id="3" name="Content Placeholder 2"/>
+          <p:cNvSpPr>
+            <a:spLocks noGrp="1"/>
+          </p:cNvSpPr>
+          <p:nvPr>
+            <p:ph idx="1"/>
+          </p:nvPr>
+        </p:nvSpPr>
+        <p:spPr/>
+        <p:txBody>
+          <a:bodyPr>
+            <a:normAutofit fontScale="92500" lnSpcReduction="20000"/>
+          </a:bodyPr>
+          <a:lstStyle/>
+          <a:p>
+            <a:r>
+              <a:rPr lang="pl-PL" dirty="0" smtClean="0"/>
+              <a:t>Użycie statycznych elementów klasy powinno być unikane</a:t>
+            </a:r>
+          </a:p>
+          <a:p>
+            <a:r>
+              <a:rPr lang="pl-PL" dirty="0" smtClean="0"/>
+              <a:t>Tworzą one elementy globalne w systemie</a:t>
+            </a:r>
+          </a:p>
+          <a:p>
+            <a:r>
+              <a:rPr lang="pl-PL" dirty="0" smtClean="0"/>
+              <a:t>Elementy statyczne sprawiają, że system jest mniej elastyczny i bardziej „kruchy”</a:t>
+            </a:r>
+          </a:p>
+          <a:p>
+            <a:r>
+              <a:rPr lang="pl-PL" dirty="0" smtClean="0"/>
+              <a:t>Istnieją okazje, kiedy zmienna statyczne są zalecane, ale ich liczba powinna być utrzymywana na niskim poziomie</a:t>
+            </a:r>
+          </a:p>
+          <a:p>
+            <a:r>
+              <a:rPr lang="pl-PL" dirty="0" smtClean="0"/>
+              <a:t>Należy zawsze pomyśleć dwa razy zanim użyje się zmiennej statycznej</a:t>
+            </a:r>
+            <a:endParaRPr lang="en-GB" dirty="0"/>
+          </a:p>
+        </p:txBody>
+      </p:sp>
+    </p:spTree>
+    <p:extLst>
+      <p:ext uri="{BB962C8B-B14F-4D97-AF65-F5344CB8AC3E}">
+        <p14:creationId xmlns:p14="http://schemas.microsoft.com/office/powerpoint/2010/main" val="1618062032"/>
       </p:ext>
     </p:extLst>
   </p:cSld>
@@ -7588,6 +8338,340 @@
     <p:extLst>
       <p:ext uri="{BB962C8B-B14F-4D97-AF65-F5344CB8AC3E}">
         <p14:creationId xmlns:p14="http://schemas.microsoft.com/office/powerpoint/2010/main" val="877870627"/>
+      </p:ext>
+    </p:extLst>
+  </p:cSld>
+  <p:clrMapOvr>
+    <a:masterClrMapping/>
+  </p:clrMapOvr>
+</p:sld>
+</file>
+
+<file path=ppt/slides/slide50.xml><?xml version="1.0" encoding="utf-8"?>
+<p:sld xmlns:a="http://schemas.openxmlformats.org/drawingml/2006/main" xmlns:r="http://schemas.openxmlformats.org/officeDocument/2006/relationships" xmlns:p="http://schemas.openxmlformats.org/presentationml/2006/main">
+  <p:cSld>
+    <p:spTree>
+      <p:nvGrpSpPr>
+        <p:cNvPr id="1" name=""/>
+        <p:cNvGrpSpPr/>
+        <p:nvPr/>
+      </p:nvGrpSpPr>
+      <p:grpSpPr>
+        <a:xfrm>
+          <a:off x="0" y="0"/>
+          <a:ext cx="0" cy="0"/>
+          <a:chOff x="0" y="0"/>
+          <a:chExt cx="0" cy="0"/>
+        </a:xfrm>
+      </p:grpSpPr>
+      <p:sp>
+        <p:nvSpPr>
+          <p:cNvPr id="2" name="Title 1"/>
+          <p:cNvSpPr>
+            <a:spLocks noGrp="1"/>
+          </p:cNvSpPr>
+          <p:nvPr>
+            <p:ph type="title"/>
+          </p:nvPr>
+        </p:nvSpPr>
+        <p:spPr/>
+        <p:txBody>
+          <a:bodyPr/>
+          <a:lstStyle/>
+          <a:p>
+            <a:r>
+              <a:rPr lang="pl-PL" dirty="0" smtClean="0"/>
+              <a:t>„Za”</a:t>
+            </a:r>
+            <a:endParaRPr lang="en-GB" dirty="0"/>
+          </a:p>
+        </p:txBody>
+      </p:sp>
+      <p:sp>
+        <p:nvSpPr>
+          <p:cNvPr id="3" name="Content Placeholder 2"/>
+          <p:cNvSpPr>
+            <a:spLocks noGrp="1"/>
+          </p:cNvSpPr>
+          <p:nvPr>
+            <p:ph idx="1"/>
+          </p:nvPr>
+        </p:nvSpPr>
+        <p:spPr/>
+        <p:txBody>
+          <a:bodyPr/>
+          <a:lstStyle/>
+          <a:p>
+            <a:r>
+              <a:rPr lang="pl-PL" dirty="0" smtClean="0"/>
+              <a:t>Współdzielone zasoby takie jak bazy danych, pliki, usługi zdalne mają zapewniony unikalny punkt dostępowy.</a:t>
+            </a:r>
+          </a:p>
+          <a:p>
+            <a:r>
+              <a:rPr lang="pl-PL" dirty="0" smtClean="0"/>
+              <a:t>Globalny stan aplikacji jest chroniony, ponieważ jest tylko jeden punkt dostępu</a:t>
+            </a:r>
+          </a:p>
+          <a:p>
+            <a:r>
+              <a:rPr lang="pl-PL" dirty="0" smtClean="0"/>
+              <a:t>Singletony są inicjalizowane tylko raz zatem są wydajne (do inicjalizacji).</a:t>
+            </a:r>
+            <a:endParaRPr lang="en-GB" dirty="0"/>
+          </a:p>
+        </p:txBody>
+      </p:sp>
+    </p:spTree>
+    <p:extLst>
+      <p:ext uri="{BB962C8B-B14F-4D97-AF65-F5344CB8AC3E}">
+        <p14:creationId xmlns:p14="http://schemas.microsoft.com/office/powerpoint/2010/main" val="1881269533"/>
+      </p:ext>
+    </p:extLst>
+  </p:cSld>
+  <p:clrMapOvr>
+    <a:masterClrMapping/>
+  </p:clrMapOvr>
+</p:sld>
+</file>
+
+<file path=ppt/slides/slide51.xml><?xml version="1.0" encoding="utf-8"?>
+<p:sld xmlns:a="http://schemas.openxmlformats.org/drawingml/2006/main" xmlns:r="http://schemas.openxmlformats.org/officeDocument/2006/relationships" xmlns:p="http://schemas.openxmlformats.org/presentationml/2006/main">
+  <p:cSld>
+    <p:spTree>
+      <p:nvGrpSpPr>
+        <p:cNvPr id="1" name=""/>
+        <p:cNvGrpSpPr/>
+        <p:nvPr/>
+      </p:nvGrpSpPr>
+      <p:grpSpPr>
+        <a:xfrm>
+          <a:off x="0" y="0"/>
+          <a:ext cx="0" cy="0"/>
+          <a:chOff x="0" y="0"/>
+          <a:chExt cx="0" cy="0"/>
+        </a:xfrm>
+      </p:grpSpPr>
+      <p:sp>
+        <p:nvSpPr>
+          <p:cNvPr id="2" name="Title 1"/>
+          <p:cNvSpPr>
+            <a:spLocks noGrp="1"/>
+          </p:cNvSpPr>
+          <p:nvPr>
+            <p:ph type="title"/>
+          </p:nvPr>
+        </p:nvSpPr>
+        <p:spPr/>
+        <p:txBody>
+          <a:bodyPr/>
+          <a:lstStyle/>
+          <a:p>
+            <a:r>
+              <a:rPr lang="pl-PL" dirty="0" smtClean="0"/>
+              <a:t>„Przeciw”</a:t>
+            </a:r>
+            <a:endParaRPr lang="en-GB" dirty="0"/>
+          </a:p>
+        </p:txBody>
+      </p:sp>
+      <p:sp>
+        <p:nvSpPr>
+          <p:cNvPr id="3" name="Content Placeholder 2"/>
+          <p:cNvSpPr>
+            <a:spLocks noGrp="1"/>
+          </p:cNvSpPr>
+          <p:nvPr>
+            <p:ph idx="1"/>
+          </p:nvPr>
+        </p:nvSpPr>
+        <p:spPr/>
+        <p:txBody>
+          <a:bodyPr/>
+          <a:lstStyle/>
+          <a:p>
+            <a:r>
+              <a:rPr lang="pl-PL" dirty="0" smtClean="0"/>
+              <a:t>Każda klasa powinna mieć tylko jedną odpowiedzialność</a:t>
+            </a:r>
+          </a:p>
+          <a:p>
+            <a:r>
+              <a:rPr lang="pl-PL" dirty="0" smtClean="0"/>
+              <a:t>Singleton ma zapach zmiennej globalnej, ale nią nie jest, jest całą globalną klasą, która może być modyfikowana z dowolnego punktu programu</a:t>
+            </a:r>
+          </a:p>
+          <a:p>
+            <a:r>
+              <a:rPr lang="pl-PL" dirty="0" smtClean="0"/>
+              <a:t>To prowadzi do niestabilnego oprogramowania</a:t>
+            </a:r>
+            <a:endParaRPr lang="en-GB" dirty="0"/>
+          </a:p>
+        </p:txBody>
+      </p:sp>
+    </p:spTree>
+    <p:extLst>
+      <p:ext uri="{BB962C8B-B14F-4D97-AF65-F5344CB8AC3E}">
+        <p14:creationId xmlns:p14="http://schemas.microsoft.com/office/powerpoint/2010/main" val="51350870"/>
+      </p:ext>
+    </p:extLst>
+  </p:cSld>
+  <p:clrMapOvr>
+    <a:masterClrMapping/>
+  </p:clrMapOvr>
+</p:sld>
+</file>
+
+<file path=ppt/slides/slide52.xml><?xml version="1.0" encoding="utf-8"?>
+<p:sld xmlns:a="http://schemas.openxmlformats.org/drawingml/2006/main" xmlns:r="http://schemas.openxmlformats.org/officeDocument/2006/relationships" xmlns:p="http://schemas.openxmlformats.org/presentationml/2006/main">
+  <p:cSld>
+    <p:spTree>
+      <p:nvGrpSpPr>
+        <p:cNvPr id="1" name=""/>
+        <p:cNvGrpSpPr/>
+        <p:nvPr/>
+      </p:nvGrpSpPr>
+      <p:grpSpPr>
+        <a:xfrm>
+          <a:off x="0" y="0"/>
+          <a:ext cx="0" cy="0"/>
+          <a:chOff x="0" y="0"/>
+          <a:chExt cx="0" cy="0"/>
+        </a:xfrm>
+      </p:grpSpPr>
+      <p:sp>
+        <p:nvSpPr>
+          <p:cNvPr id="2" name="Title 1"/>
+          <p:cNvSpPr>
+            <a:spLocks noGrp="1"/>
+          </p:cNvSpPr>
+          <p:nvPr>
+            <p:ph type="title"/>
+          </p:nvPr>
+        </p:nvSpPr>
+        <p:spPr/>
+        <p:txBody>
+          <a:bodyPr/>
+          <a:lstStyle/>
+          <a:p>
+            <a:r>
+              <a:rPr lang="pl-PL" dirty="0"/>
+              <a:t>„Przeciw”</a:t>
+            </a:r>
+            <a:endParaRPr lang="en-GB" dirty="0"/>
+          </a:p>
+        </p:txBody>
+      </p:sp>
+      <p:sp>
+        <p:nvSpPr>
+          <p:cNvPr id="3" name="Content Placeholder 2"/>
+          <p:cNvSpPr>
+            <a:spLocks noGrp="1"/>
+          </p:cNvSpPr>
+          <p:nvPr>
+            <p:ph idx="1"/>
+          </p:nvPr>
+        </p:nvSpPr>
+        <p:spPr/>
+        <p:txBody>
+          <a:bodyPr>
+            <a:normAutofit lnSpcReduction="10000"/>
+          </a:bodyPr>
+          <a:lstStyle/>
+          <a:p>
+            <a:r>
+              <a:rPr lang="pl-PL" dirty="0" smtClean="0"/>
+              <a:t>Singleton promuje silne tight coupling pomiędzy klasami. Nie istnieje abstrakcyjny singleton.</a:t>
+            </a:r>
+          </a:p>
+          <a:p>
+            <a:r>
+              <a:rPr lang="pl-PL" dirty="0" smtClean="0"/>
+              <a:t>Nie ma możliwości testowania i mockowania klasy typu singleton. Jest ona zamknięta (sealed) i nie ma klasy rodzica, zatem nie można wykorzystać podstawienia Liskov.</a:t>
+            </a:r>
+          </a:p>
+          <a:p>
+            <a:r>
+              <a:rPr lang="pl-PL" dirty="0" smtClean="0"/>
+              <a:t>Testy jednostkowe powinny być wyizolowane – jeden test nie powinien wpływać na inny.</a:t>
+            </a:r>
+            <a:endParaRPr lang="en-GB" dirty="0"/>
+          </a:p>
+        </p:txBody>
+      </p:sp>
+    </p:spTree>
+    <p:extLst>
+      <p:ext uri="{BB962C8B-B14F-4D97-AF65-F5344CB8AC3E}">
+        <p14:creationId xmlns:p14="http://schemas.microsoft.com/office/powerpoint/2010/main" val="2566980105"/>
+      </p:ext>
+    </p:extLst>
+  </p:cSld>
+  <p:clrMapOvr>
+    <a:masterClrMapping/>
+  </p:clrMapOvr>
+</p:sld>
+</file>
+
+<file path=ppt/slides/slide53.xml><?xml version="1.0" encoding="utf-8"?>
+<p:sld xmlns:a="http://schemas.openxmlformats.org/drawingml/2006/main" xmlns:r="http://schemas.openxmlformats.org/officeDocument/2006/relationships" xmlns:p="http://schemas.openxmlformats.org/presentationml/2006/main">
+  <p:cSld>
+    <p:spTree>
+      <p:nvGrpSpPr>
+        <p:cNvPr id="1" name=""/>
+        <p:cNvGrpSpPr/>
+        <p:nvPr/>
+      </p:nvGrpSpPr>
+      <p:grpSpPr>
+        <a:xfrm>
+          <a:off x="0" y="0"/>
+          <a:ext cx="0" cy="0"/>
+          <a:chOff x="0" y="0"/>
+          <a:chExt cx="0" cy="0"/>
+        </a:xfrm>
+      </p:grpSpPr>
+      <p:sp>
+        <p:nvSpPr>
+          <p:cNvPr id="2" name="Title 1"/>
+          <p:cNvSpPr>
+            <a:spLocks noGrp="1"/>
+          </p:cNvSpPr>
+          <p:nvPr>
+            <p:ph type="title"/>
+          </p:nvPr>
+        </p:nvSpPr>
+        <p:spPr/>
+        <p:txBody>
+          <a:bodyPr/>
+          <a:lstStyle/>
+          <a:p>
+            <a:endParaRPr lang="en-GB"/>
+          </a:p>
+        </p:txBody>
+      </p:sp>
+      <p:sp>
+        <p:nvSpPr>
+          <p:cNvPr id="3" name="Content Placeholder 2"/>
+          <p:cNvSpPr>
+            <a:spLocks noGrp="1"/>
+          </p:cNvSpPr>
+          <p:nvPr>
+            <p:ph idx="1"/>
+          </p:nvPr>
+        </p:nvSpPr>
+        <p:spPr/>
+        <p:txBody>
+          <a:bodyPr/>
+          <a:lstStyle/>
+          <a:p>
+            <a:endParaRPr lang="en-GB"/>
+          </a:p>
+        </p:txBody>
+      </p:sp>
+    </p:spTree>
+    <p:extLst>
+      <p:ext uri="{BB962C8B-B14F-4D97-AF65-F5344CB8AC3E}">
+        <p14:creationId xmlns:p14="http://schemas.microsoft.com/office/powerpoint/2010/main" val="3513009154"/>
       </p:ext>
     </p:extLst>
   </p:cSld>

</xml_diff>